<commit_message>
Presentation, work in progress
</commit_message>
<xml_diff>
--- a/Presentation/Präsentation Integrationsprojekt.pptx
+++ b/Presentation/Präsentation Integrationsprojekt.pptx
@@ -5,20 +5,22 @@
     <p:sldMasterId id="2147483669" r:id="rId4"/>
   </p:sldMasterIdLst>
   <p:notesMasterIdLst>
-    <p:notesMasterId r:id="rId13"/>
+    <p:notesMasterId r:id="rId15"/>
   </p:notesMasterIdLst>
   <p:handoutMasterIdLst>
-    <p:handoutMasterId r:id="rId14"/>
+    <p:handoutMasterId r:id="rId16"/>
   </p:handoutMasterIdLst>
   <p:sldIdLst>
     <p:sldId id="259" r:id="rId5"/>
     <p:sldId id="263" r:id="rId6"/>
-    <p:sldId id="257" r:id="rId7"/>
-    <p:sldId id="264" r:id="rId8"/>
-    <p:sldId id="265" r:id="rId9"/>
-    <p:sldId id="266" r:id="rId10"/>
-    <p:sldId id="267" r:id="rId11"/>
-    <p:sldId id="273" r:id="rId12"/>
+    <p:sldId id="264" r:id="rId7"/>
+    <p:sldId id="266" r:id="rId8"/>
+    <p:sldId id="267" r:id="rId9"/>
+    <p:sldId id="274" r:id="rId10"/>
+    <p:sldId id="275" r:id="rId11"/>
+    <p:sldId id="276" r:id="rId12"/>
+    <p:sldId id="277" r:id="rId13"/>
+    <p:sldId id="273" r:id="rId14"/>
   </p:sldIdLst>
   <p:sldSz cx="9144000" cy="6858000" type="screen4x3"/>
   <p:notesSz cx="6735763" cy="9866313"/>
@@ -262,7 +264,7 @@
           <a:p>
             <a:fld id="{EFA0D184-D464-48E9-9CA0-A94E873F6C2C}" type="datetimeFigureOut">
               <a:rPr lang="de-CH" smtClean="0"/>
-              <a:t>14.09.2015</a:t>
+              <a:t>15.09.2015</a:t>
             </a:fld>
             <a:endParaRPr lang="de-CH"/>
           </a:p>
@@ -328,7 +330,7 @@
           <a:p>
             <a:fld id="{5F377753-DB7C-4FA7-98FC-17681D88797A}" type="slidenum">
               <a:rPr lang="de-CH" smtClean="0"/>
-              <a:t>‹Nr.›</a:t>
+              <a:t>‹#›</a:t>
             </a:fld>
             <a:endParaRPr lang="de-CH"/>
           </a:p>
@@ -427,7 +429,7 @@
           <a:p>
             <a:fld id="{5AF2B663-2BA9-4D7E-8201-5DE4109E1EDD}" type="datetimeFigureOut">
               <a:rPr lang="de-CH" smtClean="0"/>
-              <a:t>14.09.2015</a:t>
+              <a:t>15.09.2015</a:t>
             </a:fld>
             <a:endParaRPr lang="de-CH"/>
           </a:p>
@@ -586,7 +588,7 @@
           <a:p>
             <a:fld id="{37E44704-8E6D-4CF2-8CFA-A0F7BC751896}" type="slidenum">
               <a:rPr lang="de-CH" smtClean="0"/>
-              <a:t>‹Nr.›</a:t>
+              <a:t>‹#›</a:t>
             </a:fld>
             <a:endParaRPr lang="de-CH"/>
           </a:p>
@@ -853,7 +855,7 @@
     </p:spTree>
     <p:extLst>
       <p:ext uri="{BB962C8B-B14F-4D97-AF65-F5344CB8AC3E}">
-        <p14:creationId xmlns:p14="http://schemas.microsoft.com/office/powerpoint/2010/main" val="455600785"/>
+        <p14:creationId xmlns:p14="http://schemas.microsoft.com/office/powerpoint/2010/main" val="3126661833"/>
       </p:ext>
     </p:extLst>
   </p:cSld>
@@ -937,7 +939,7 @@
     </p:spTree>
     <p:extLst>
       <p:ext uri="{BB962C8B-B14F-4D97-AF65-F5344CB8AC3E}">
-        <p14:creationId xmlns:p14="http://schemas.microsoft.com/office/powerpoint/2010/main" val="3126661833"/>
+        <p14:creationId xmlns:p14="http://schemas.microsoft.com/office/powerpoint/2010/main" val="1648529491"/>
       </p:ext>
     </p:extLst>
   </p:cSld>
@@ -1021,7 +1023,7 @@
     </p:spTree>
     <p:extLst>
       <p:ext uri="{BB962C8B-B14F-4D97-AF65-F5344CB8AC3E}">
-        <p14:creationId xmlns:p14="http://schemas.microsoft.com/office/powerpoint/2010/main" val="1010933662"/>
+        <p14:creationId xmlns:p14="http://schemas.microsoft.com/office/powerpoint/2010/main" val="4166537278"/>
       </p:ext>
     </p:extLst>
   </p:cSld>
@@ -1096,175 +1098,7 @@
           <a:p>
             <a:fld id="{37E44704-8E6D-4CF2-8CFA-A0F7BC751896}" type="slidenum">
               <a:rPr lang="de-CH" smtClean="0"/>
-              <a:t>6</a:t>
-            </a:fld>
-            <a:endParaRPr lang="de-CH"/>
-          </a:p>
-        </p:txBody>
-      </p:sp>
-    </p:spTree>
-    <p:extLst>
-      <p:ext uri="{BB962C8B-B14F-4D97-AF65-F5344CB8AC3E}">
-        <p14:creationId xmlns:p14="http://schemas.microsoft.com/office/powerpoint/2010/main" val="1648529491"/>
-      </p:ext>
-    </p:extLst>
-  </p:cSld>
-  <p:clrMapOvr>
-    <a:masterClrMapping/>
-  </p:clrMapOvr>
-</p:notes>
-</file>
-
-<file path=ppt/notesSlides/notesSlide6.xml><?xml version="1.0" encoding="utf-8"?>
-<p:notes xmlns:a="http://schemas.openxmlformats.org/drawingml/2006/main" xmlns:r="http://schemas.openxmlformats.org/officeDocument/2006/relationships" xmlns:p="http://schemas.openxmlformats.org/presentationml/2006/main">
-  <p:cSld>
-    <p:spTree>
-      <p:nvGrpSpPr>
-        <p:cNvPr id="1" name=""/>
-        <p:cNvGrpSpPr/>
-        <p:nvPr/>
-      </p:nvGrpSpPr>
-      <p:grpSpPr>
-        <a:xfrm>
-          <a:off x="0" y="0"/>
-          <a:ext cx="0" cy="0"/>
-          <a:chOff x="0" y="0"/>
-          <a:chExt cx="0" cy="0"/>
-        </a:xfrm>
-      </p:grpSpPr>
-      <p:sp>
-        <p:nvSpPr>
-          <p:cNvPr id="2" name="Slide Image Placeholder 1"/>
-          <p:cNvSpPr>
-            <a:spLocks noGrp="1" noRot="1" noChangeAspect="1"/>
-          </p:cNvSpPr>
-          <p:nvPr>
-            <p:ph type="sldImg"/>
-          </p:nvPr>
-        </p:nvSpPr>
-        <p:spPr/>
-      </p:sp>
-      <p:sp>
-        <p:nvSpPr>
-          <p:cNvPr id="3" name="Notes Placeholder 2"/>
-          <p:cNvSpPr>
-            <a:spLocks noGrp="1"/>
-          </p:cNvSpPr>
-          <p:nvPr>
-            <p:ph type="body" idx="1"/>
-          </p:nvPr>
-        </p:nvSpPr>
-        <p:spPr/>
-        <p:txBody>
-          <a:bodyPr/>
-          <a:lstStyle/>
-          <a:p>
-            <a:endParaRPr lang="de-CH" dirty="0"/>
-          </a:p>
-        </p:txBody>
-      </p:sp>
-      <p:sp>
-        <p:nvSpPr>
-          <p:cNvPr id="4" name="Slide Number Placeholder 3"/>
-          <p:cNvSpPr>
-            <a:spLocks noGrp="1"/>
-          </p:cNvSpPr>
-          <p:nvPr>
-            <p:ph type="sldNum" sz="quarter" idx="10"/>
-          </p:nvPr>
-        </p:nvSpPr>
-        <p:spPr/>
-        <p:txBody>
-          <a:bodyPr/>
-          <a:lstStyle/>
-          <a:p>
-            <a:fld id="{37E44704-8E6D-4CF2-8CFA-A0F7BC751896}" type="slidenum">
-              <a:rPr lang="de-CH" smtClean="0"/>
-              <a:t>7</a:t>
-            </a:fld>
-            <a:endParaRPr lang="de-CH"/>
-          </a:p>
-        </p:txBody>
-      </p:sp>
-    </p:spTree>
-    <p:extLst>
-      <p:ext uri="{BB962C8B-B14F-4D97-AF65-F5344CB8AC3E}">
-        <p14:creationId xmlns:p14="http://schemas.microsoft.com/office/powerpoint/2010/main" val="4166537278"/>
-      </p:ext>
-    </p:extLst>
-  </p:cSld>
-  <p:clrMapOvr>
-    <a:masterClrMapping/>
-  </p:clrMapOvr>
-</p:notes>
-</file>
-
-<file path=ppt/notesSlides/notesSlide7.xml><?xml version="1.0" encoding="utf-8"?>
-<p:notes xmlns:a="http://schemas.openxmlformats.org/drawingml/2006/main" xmlns:r="http://schemas.openxmlformats.org/officeDocument/2006/relationships" xmlns:p="http://schemas.openxmlformats.org/presentationml/2006/main">
-  <p:cSld>
-    <p:spTree>
-      <p:nvGrpSpPr>
-        <p:cNvPr id="1" name=""/>
-        <p:cNvGrpSpPr/>
-        <p:nvPr/>
-      </p:nvGrpSpPr>
-      <p:grpSpPr>
-        <a:xfrm>
-          <a:off x="0" y="0"/>
-          <a:ext cx="0" cy="0"/>
-          <a:chOff x="0" y="0"/>
-          <a:chExt cx="0" cy="0"/>
-        </a:xfrm>
-      </p:grpSpPr>
-      <p:sp>
-        <p:nvSpPr>
-          <p:cNvPr id="2" name="Slide Image Placeholder 1"/>
-          <p:cNvSpPr>
-            <a:spLocks noGrp="1" noRot="1" noChangeAspect="1"/>
-          </p:cNvSpPr>
-          <p:nvPr>
-            <p:ph type="sldImg"/>
-          </p:nvPr>
-        </p:nvSpPr>
-        <p:spPr/>
-      </p:sp>
-      <p:sp>
-        <p:nvSpPr>
-          <p:cNvPr id="3" name="Notes Placeholder 2"/>
-          <p:cNvSpPr>
-            <a:spLocks noGrp="1"/>
-          </p:cNvSpPr>
-          <p:nvPr>
-            <p:ph type="body" idx="1"/>
-          </p:nvPr>
-        </p:nvSpPr>
-        <p:spPr/>
-        <p:txBody>
-          <a:bodyPr/>
-          <a:lstStyle/>
-          <a:p>
-            <a:endParaRPr lang="de-CH" dirty="0"/>
-          </a:p>
-        </p:txBody>
-      </p:sp>
-      <p:sp>
-        <p:nvSpPr>
-          <p:cNvPr id="4" name="Slide Number Placeholder 3"/>
-          <p:cNvSpPr>
-            <a:spLocks noGrp="1"/>
-          </p:cNvSpPr>
-          <p:nvPr>
-            <p:ph type="sldNum" sz="quarter" idx="10"/>
-          </p:nvPr>
-        </p:nvSpPr>
-        <p:spPr/>
-        <p:txBody>
-          <a:bodyPr/>
-          <a:lstStyle/>
-          <a:p>
-            <a:fld id="{37E44704-8E6D-4CF2-8CFA-A0F7BC751896}" type="slidenum">
-              <a:rPr lang="de-CH" smtClean="0"/>
-              <a:t>8</a:t>
+              <a:t>10</a:t>
             </a:fld>
             <a:endParaRPr lang="de-CH"/>
           </a:p>
@@ -2625,7 +2459,7 @@
           <a:p>
             <a:fld id="{F19AE9A8-34D4-4E8C-BE9C-13C550F1BED0}" type="slidenum">
               <a:rPr lang="de-CH" smtClean="0"/>
-              <a:t>‹Nr.›</a:t>
+              <a:t>‹#›</a:t>
             </a:fld>
             <a:endParaRPr lang="de-CH" dirty="0"/>
           </a:p>
@@ -2678,7 +2512,7 @@
           <a:p>
             <a:fld id="{F19AE9A8-34D4-4E8C-BE9C-13C550F1BED0}" type="slidenum">
               <a:rPr lang="de-CH" smtClean="0"/>
-              <a:t>‹Nr.›</a:t>
+              <a:t>‹#›</a:t>
             </a:fld>
             <a:endParaRPr lang="de-CH" dirty="0"/>
           </a:p>
@@ -3706,7 +3540,7 @@
           <a:p>
             <a:fld id="{F19AE9A8-34D4-4E8C-BE9C-13C550F1BED0}" type="slidenum">
               <a:rPr lang="de-CH" smtClean="0"/>
-              <a:t>‹Nr.›</a:t>
+              <a:t>‹#›</a:t>
             </a:fld>
             <a:endParaRPr lang="de-CH" dirty="0"/>
           </a:p>
@@ -4095,7 +3929,7 @@
           <a:p>
             <a:fld id="{F19AE9A8-34D4-4E8C-BE9C-13C550F1BED0}" type="slidenum">
               <a:rPr lang="de-CH" smtClean="0"/>
-              <a:t>‹Nr.›</a:t>
+              <a:t>‹#›</a:t>
             </a:fld>
             <a:endParaRPr lang="de-CH" dirty="0"/>
           </a:p>
@@ -4322,7 +4156,7 @@
           <a:p>
             <a:fld id="{F19AE9A8-34D4-4E8C-BE9C-13C550F1BED0}" type="slidenum">
               <a:rPr lang="de-CH" smtClean="0"/>
-              <a:t>‹Nr.›</a:t>
+              <a:t>‹#›</a:t>
             </a:fld>
             <a:endParaRPr lang="de-CH" dirty="0"/>
           </a:p>
@@ -4623,7 +4457,7 @@
           <a:p>
             <a:fld id="{F19AE9A8-34D4-4E8C-BE9C-13C550F1BED0}" type="slidenum">
               <a:rPr lang="de-CH" smtClean="0"/>
-              <a:t>‹Nr.›</a:t>
+              <a:t>‹#›</a:t>
             </a:fld>
             <a:endParaRPr lang="de-CH" dirty="0"/>
           </a:p>
@@ -5146,7 +4980,7 @@
           <a:p>
             <a:fld id="{F19AE9A8-34D4-4E8C-BE9C-13C550F1BED0}" type="slidenum">
               <a:rPr lang="de-CH" smtClean="0"/>
-              <a:t>‹Nr.›</a:t>
+              <a:t>‹#›</a:t>
             </a:fld>
             <a:endParaRPr lang="de-CH" dirty="0"/>
           </a:p>
@@ -5669,7 +5503,7 @@
           <a:p>
             <a:fld id="{F19AE9A8-34D4-4E8C-BE9C-13C550F1BED0}" type="slidenum">
               <a:rPr lang="de-CH" smtClean="0"/>
-              <a:t>‹Nr.›</a:t>
+              <a:t>‹#›</a:t>
             </a:fld>
             <a:endParaRPr lang="de-CH" dirty="0"/>
           </a:p>
@@ -6389,7 +6223,7 @@
           <a:p>
             <a:fld id="{F19AE9A8-34D4-4E8C-BE9C-13C550F1BED0}" type="slidenum">
               <a:rPr lang="de-CH" smtClean="0"/>
-              <a:t>‹Nr.›</a:t>
+              <a:t>‹#›</a:t>
             </a:fld>
             <a:endParaRPr lang="de-CH" dirty="0"/>
           </a:p>
@@ -6775,7 +6609,7 @@
             <a:fld id="{F19AE9A8-34D4-4E8C-BE9C-13C550F1BED0}" type="slidenum">
               <a:rPr lang="de-CH" smtClean="0"/>
               <a:pPr/>
-              <a:t>‹Nr.›</a:t>
+              <a:t>‹#›</a:t>
             </a:fld>
             <a:endParaRPr lang="de-CH" dirty="0"/>
           </a:p>
@@ -7237,15 +7071,7 @@
           <a:p>
             <a:r>
               <a:rPr lang="de-CH" dirty="0" smtClean="0"/>
-              <a:t>HTML5</a:t>
-            </a:r>
-            <a:r>
-              <a:rPr lang="de-CH" dirty="0" smtClean="0"/>
-              <a:t> </a:t>
-            </a:r>
-            <a:r>
-              <a:rPr lang="de-CH" dirty="0" smtClean="0"/>
-              <a:t>- Integrationsprojekt</a:t>
+              <a:t>HTML5 - Integrationsprojekt</a:t>
             </a:r>
             <a:endParaRPr lang="de-CH" dirty="0"/>
           </a:p>
@@ -7268,11 +7094,7 @@
           <a:p>
             <a:r>
               <a:rPr lang="de-CH" sz="1400" dirty="0" smtClean="0"/>
-              <a:t>Kevin Kreuzer, </a:t>
-            </a:r>
-            <a:r>
-              <a:rPr lang="de-CH" sz="1400" dirty="0" smtClean="0"/>
-              <a:t>Daniel Jovanovic, </a:t>
+              <a:t>Kevin Kreuzer, Daniel Jovanovic, </a:t>
             </a:r>
             <a:r>
               <a:rPr lang="de-CH" sz="1400" dirty="0" err="1" smtClean="0"/>
@@ -7288,11 +7110,7 @@
             </a:r>
             <a:r>
               <a:rPr lang="de-CH" sz="1400" dirty="0" smtClean="0"/>
-              <a:t>, </a:t>
-            </a:r>
-            <a:r>
-              <a:rPr lang="de-CH" sz="1400" dirty="0" smtClean="0"/>
-              <a:t>Matteo Locher</a:t>
+              <a:t>, Matteo Locher</a:t>
             </a:r>
             <a:endParaRPr lang="de-CH" sz="1400" dirty="0"/>
           </a:p>
@@ -7318,11 +7136,7 @@
             </a:pPr>
             <a:r>
               <a:rPr lang="en-US" smtClean="0"/>
-              <a:t>CAS </a:t>
-            </a:r>
-            <a:r>
-              <a:rPr lang="en-US" smtClean="0"/>
-              <a:t>HTML FS15</a:t>
+              <a:t>CAS HTML FS15</a:t>
             </a:r>
             <a:endParaRPr lang="de-CH" dirty="0"/>
           </a:p>
@@ -7332,6 +7146,105 @@
     <p:extLst>
       <p:ext uri="{BB962C8B-B14F-4D97-AF65-F5344CB8AC3E}">
         <p14:creationId xmlns:p14="http://schemas.microsoft.com/office/powerpoint/2010/main" val="1801327458"/>
+      </p:ext>
+    </p:extLst>
+  </p:cSld>
+  <p:clrMapOvr>
+    <a:masterClrMapping/>
+  </p:clrMapOvr>
+  <p:timing>
+    <p:tnLst>
+      <p:par>
+        <p:cTn id="1" dur="indefinite" restart="never" nodeType="tmRoot"/>
+      </p:par>
+    </p:tnLst>
+  </p:timing>
+</p:sld>
+</file>
+
+<file path=ppt/slides/slide10.xml><?xml version="1.0" encoding="utf-8"?>
+<p:sld xmlns:a="http://schemas.openxmlformats.org/drawingml/2006/main" xmlns:r="http://schemas.openxmlformats.org/officeDocument/2006/relationships" xmlns:p="http://schemas.openxmlformats.org/presentationml/2006/main">
+  <p:cSld>
+    <p:spTree>
+      <p:nvGrpSpPr>
+        <p:cNvPr id="1" name=""/>
+        <p:cNvGrpSpPr/>
+        <p:nvPr/>
+      </p:nvGrpSpPr>
+      <p:grpSpPr>
+        <a:xfrm>
+          <a:off x="0" y="0"/>
+          <a:ext cx="0" cy="0"/>
+          <a:chOff x="0" y="0"/>
+          <a:chExt cx="0" cy="0"/>
+        </a:xfrm>
+      </p:grpSpPr>
+      <p:sp>
+        <p:nvSpPr>
+          <p:cNvPr id="3" name="Titel 2"/>
+          <p:cNvSpPr>
+            <a:spLocks noGrp="1"/>
+          </p:cNvSpPr>
+          <p:nvPr>
+            <p:ph type="ctrTitle"/>
+          </p:nvPr>
+        </p:nvSpPr>
+        <p:spPr/>
+        <p:txBody>
+          <a:bodyPr/>
+          <a:lstStyle/>
+          <a:p>
+            <a:endParaRPr lang="de-CH" dirty="0"/>
+          </a:p>
+        </p:txBody>
+      </p:sp>
+      <p:pic>
+        <p:nvPicPr>
+          <p:cNvPr id="1026" name="Picture 2" descr="http://www.fotoalbumshop.de/blog/wp-content/uploads/spezifische_fragen.jpg"/>
+          <p:cNvPicPr>
+            <a:picLocks noGrp="1" noChangeAspect="1" noChangeArrowheads="1"/>
+          </p:cNvPicPr>
+          <p:nvPr>
+            <p:ph sz="half" idx="1"/>
+          </p:nvPr>
+        </p:nvPicPr>
+        <p:blipFill>
+          <a:blip r:embed="rId3">
+            <a:extLst>
+              <a:ext uri="{28A0092B-C50C-407E-A947-70E740481C1C}">
+                <a14:useLocalDpi xmlns:a14="http://schemas.microsoft.com/office/drawing/2010/main" val="0"/>
+              </a:ext>
+            </a:extLst>
+          </a:blip>
+          <a:srcRect/>
+          <a:stretch>
+            <a:fillRect/>
+          </a:stretch>
+        </p:blipFill>
+        <p:spPr bwMode="auto">
+          <a:xfrm>
+            <a:off x="962025" y="1716088"/>
+            <a:ext cx="7112000" cy="3289300"/>
+          </a:xfrm>
+          <a:prstGeom prst="rect">
+            <a:avLst/>
+          </a:prstGeom>
+          <a:noFill/>
+          <a:extLst>
+            <a:ext uri="{909E8E84-426E-40DD-AFC4-6F175D3DCCD1}">
+              <a14:hiddenFill xmlns:a14="http://schemas.microsoft.com/office/drawing/2010/main">
+                <a:solidFill>
+                  <a:srgbClr val="FFFFFF"/>
+                </a:solidFill>
+              </a14:hiddenFill>
+            </a:ext>
+          </a:extLst>
+        </p:spPr>
+      </p:pic>
+    </p:spTree>
+    <p:extLst>
+      <p:ext uri="{BB962C8B-B14F-4D97-AF65-F5344CB8AC3E}">
+        <p14:creationId xmlns:p14="http://schemas.microsoft.com/office/powerpoint/2010/main" val="2672802321"/>
       </p:ext>
     </p:extLst>
   </p:cSld>
@@ -7448,7 +7361,6 @@
               <a:rPr lang="en-US" dirty="0" smtClean="0"/>
               <a:t>DB</a:t>
             </a:r>
-            <a:endParaRPr lang="en-US" dirty="0" smtClean="0"/>
           </a:p>
           <a:p>
             <a:pPr>
@@ -7479,7 +7391,6 @@
               <a:rPr lang="en-US" dirty="0" smtClean="0"/>
               <a:t>???</a:t>
             </a:r>
-            <a:endParaRPr lang="en-US" dirty="0" smtClean="0"/>
           </a:p>
           <a:p>
             <a:pPr>
@@ -7563,12 +7474,12 @@
       </p:grpSpPr>
       <p:sp>
         <p:nvSpPr>
-          <p:cNvPr id="5" name="Titel 4"/>
+          <p:cNvPr id="5" name="Inhaltsplatzhalter 4"/>
           <p:cNvSpPr>
             <a:spLocks noGrp="1"/>
           </p:cNvSpPr>
           <p:nvPr>
-            <p:ph type="ctrTitle"/>
+            <p:ph sz="half" idx="1"/>
           </p:nvPr>
         </p:nvSpPr>
         <p:spPr/>
@@ -7576,22 +7487,84 @@
           <a:bodyPr/>
           <a:lstStyle/>
           <a:p>
+            <a:pPr marL="0" indent="0">
+              <a:buNone/>
+            </a:pPr>
+            <a:r>
+              <a:rPr lang="de-CH" b="1" dirty="0" smtClean="0"/>
+              <a:t>Problemstellung:</a:t>
+            </a:r>
+          </a:p>
+          <a:p>
+            <a:endParaRPr lang="de-CH" dirty="0" smtClean="0"/>
+          </a:p>
+          <a:p>
             <a:r>
               <a:rPr lang="de-CH" dirty="0" smtClean="0"/>
-              <a:t>Idee / Grundfunktion</a:t>
-            </a:r>
-            <a:endParaRPr lang="de-CH" dirty="0"/>
-          </a:p>
-        </p:txBody>
-      </p:sp>
-      <p:sp>
-        <p:nvSpPr>
-          <p:cNvPr id="6" name="Untertitel 5"/>
+              <a:t>Eine Zeiterfassung zu entwickeln welche die wichtigsten Aspekte abdecken die ein KMU benötigt</a:t>
+            </a:r>
+          </a:p>
+          <a:p>
+            <a:r>
+              <a:rPr lang="de-CH" dirty="0" smtClean="0"/>
+              <a:t>Zeit pro Mitarbeiter</a:t>
+            </a:r>
+          </a:p>
+          <a:p>
+            <a:r>
+              <a:rPr lang="de-CH" dirty="0" smtClean="0"/>
+              <a:t>Zeit pro Projekt</a:t>
+            </a:r>
+          </a:p>
+          <a:p>
+            <a:pPr marL="0" indent="0">
+              <a:buNone/>
+            </a:pPr>
+            <a:endParaRPr lang="de-CH" dirty="0" smtClean="0"/>
+          </a:p>
+          <a:p>
+            <a:pPr marL="0" indent="0">
+              <a:buNone/>
+            </a:pPr>
+            <a:r>
+              <a:rPr lang="de-CH" b="1" dirty="0" smtClean="0"/>
+              <a:t>Lösung:</a:t>
+            </a:r>
+          </a:p>
+          <a:p>
+            <a:pPr marL="0" indent="0">
+              <a:buNone/>
+            </a:pPr>
+            <a:endParaRPr lang="en-US" dirty="0" smtClean="0"/>
+          </a:p>
+          <a:p>
+            <a:r>
+              <a:rPr lang="de-CH" dirty="0" smtClean="0"/>
+              <a:t>Eine Web Applikation wo Mitarbeiter ihre Zeit jeweils direkt auf ein Projekt buchen können</a:t>
+            </a:r>
+          </a:p>
+          <a:p>
+            <a:r>
+              <a:rPr lang="de-CH" dirty="0" smtClean="0"/>
+              <a:t>Zu jedem Zeitpunkt ist es möglich eine Auswertung über den Aktuellen Saldo / Projektstand zu treffen</a:t>
+            </a:r>
+          </a:p>
+          <a:p>
+            <a:pPr marL="0" indent="0">
+              <a:buNone/>
+            </a:pPr>
+            <a:endParaRPr lang="de-CH" b="1" dirty="0" smtClean="0"/>
+          </a:p>
+        </p:txBody>
+      </p:sp>
+      <p:sp>
+        <p:nvSpPr>
+          <p:cNvPr id="4" name="Titel 3"/>
           <p:cNvSpPr>
             <a:spLocks noGrp="1"/>
           </p:cNvSpPr>
           <p:nvPr>
-            <p:ph type="subTitle" idx="1"/>
+            <p:ph type="ctrTitle"/>
           </p:nvPr>
         </p:nvSpPr>
         <p:spPr/>
@@ -7599,111 +7572,17 @@
           <a:bodyPr/>
           <a:lstStyle/>
           <a:p>
-            <a:endParaRPr lang="de-CH" dirty="0"/>
-          </a:p>
-        </p:txBody>
-      </p:sp>
-    </p:spTree>
-    <p:extLst>
-      <p:ext uri="{BB962C8B-B14F-4D97-AF65-F5344CB8AC3E}">
-        <p14:creationId xmlns:p14="http://schemas.microsoft.com/office/powerpoint/2010/main" val="3399875752"/>
-      </p:ext>
-    </p:extLst>
-  </p:cSld>
-  <p:clrMapOvr>
-    <a:masterClrMapping/>
-  </p:clrMapOvr>
-  <p:timing>
-    <p:tnLst>
-      <p:par>
-        <p:cTn id="1" dur="indefinite" restart="never" nodeType="tmRoot"/>
-      </p:par>
-    </p:tnLst>
-  </p:timing>
-</p:sld>
-</file>
-
-<file path=ppt/slides/slide4.xml><?xml version="1.0" encoding="utf-8"?>
-<p:sld xmlns:a="http://schemas.openxmlformats.org/drawingml/2006/main" xmlns:r="http://schemas.openxmlformats.org/officeDocument/2006/relationships" xmlns:p="http://schemas.openxmlformats.org/presentationml/2006/main">
-  <p:cSld>
-    <p:spTree>
-      <p:nvGrpSpPr>
-        <p:cNvPr id="1" name=""/>
-        <p:cNvGrpSpPr/>
-        <p:nvPr/>
-      </p:nvGrpSpPr>
-      <p:grpSpPr>
-        <a:xfrm>
-          <a:off x="0" y="0"/>
-          <a:ext cx="0" cy="0"/>
-          <a:chOff x="0" y="0"/>
-          <a:chExt cx="0" cy="0"/>
-        </a:xfrm>
-      </p:grpSpPr>
-      <p:sp>
-        <p:nvSpPr>
-          <p:cNvPr id="5" name="Inhaltsplatzhalter 4"/>
-          <p:cNvSpPr>
-            <a:spLocks noGrp="1"/>
-          </p:cNvSpPr>
-          <p:nvPr>
-            <p:ph sz="half" idx="1"/>
-          </p:nvPr>
-        </p:nvSpPr>
-        <p:spPr/>
-        <p:txBody>
-          <a:bodyPr/>
-          <a:lstStyle/>
-          <a:p>
-            <a:pPr marL="0" indent="0">
-              <a:buNone/>
-            </a:pPr>
-            <a:r>
-              <a:rPr lang="en-US" b="1" dirty="0" err="1" smtClean="0"/>
-              <a:t>Problemstellung</a:t>
-            </a:r>
-            <a:r>
-              <a:rPr lang="en-US" b="1" dirty="0" smtClean="0"/>
-              <a:t>:</a:t>
-            </a:r>
-          </a:p>
-          <a:p>
-            <a:endParaRPr lang="en-US" dirty="0" smtClean="0"/>
-          </a:p>
-          <a:p>
-            <a:pPr marL="0" indent="0">
-              <a:buNone/>
-            </a:pPr>
-            <a:r>
-              <a:rPr lang="en-US" b="1" dirty="0" err="1" smtClean="0"/>
-              <a:t>Lösung</a:t>
-            </a:r>
-            <a:r>
-              <a:rPr lang="en-US" b="1" dirty="0" smtClean="0"/>
-              <a:t>:</a:t>
-            </a:r>
-            <a:endParaRPr lang="en-US" b="1" dirty="0" smtClean="0"/>
-          </a:p>
-        </p:txBody>
-      </p:sp>
-      <p:sp>
-        <p:nvSpPr>
-          <p:cNvPr id="4" name="Titel 3"/>
-          <p:cNvSpPr>
-            <a:spLocks noGrp="1"/>
-          </p:cNvSpPr>
-          <p:nvPr>
-            <p:ph type="ctrTitle"/>
-          </p:nvPr>
-        </p:nvSpPr>
-        <p:spPr/>
-        <p:txBody>
-          <a:bodyPr/>
-          <a:lstStyle/>
-          <a:p>
             <a:r>
               <a:rPr lang="en-US" dirty="0" err="1" smtClean="0"/>
               <a:t>Idee</a:t>
+            </a:r>
+            <a:r>
+              <a:rPr lang="en-US" dirty="0" smtClean="0"/>
+              <a:t> / </a:t>
+            </a:r>
+            <a:r>
+              <a:rPr lang="en-US" dirty="0" err="1" smtClean="0"/>
+              <a:t>Grundfunktionen</a:t>
             </a:r>
             <a:endParaRPr lang="de-CH" dirty="0"/>
           </a:p>
@@ -7729,86 +7608,7 @@
 </p:sld>
 </file>
 
-<file path=ppt/slides/slide5.xml><?xml version="1.0" encoding="utf-8"?>
-<p:sld xmlns:a="http://schemas.openxmlformats.org/drawingml/2006/main" xmlns:r="http://schemas.openxmlformats.org/officeDocument/2006/relationships" xmlns:p="http://schemas.openxmlformats.org/presentationml/2006/main">
-  <p:cSld>
-    <p:spTree>
-      <p:nvGrpSpPr>
-        <p:cNvPr id="1" name=""/>
-        <p:cNvGrpSpPr/>
-        <p:nvPr/>
-      </p:nvGrpSpPr>
-      <p:grpSpPr>
-        <a:xfrm>
-          <a:off x="0" y="0"/>
-          <a:ext cx="0" cy="0"/>
-          <a:chOff x="0" y="0"/>
-          <a:chExt cx="0" cy="0"/>
-        </a:xfrm>
-      </p:grpSpPr>
-      <p:sp>
-        <p:nvSpPr>
-          <p:cNvPr id="5" name="Titel 4"/>
-          <p:cNvSpPr>
-            <a:spLocks noGrp="1"/>
-          </p:cNvSpPr>
-          <p:nvPr>
-            <p:ph type="ctrTitle"/>
-          </p:nvPr>
-        </p:nvSpPr>
-        <p:spPr/>
-        <p:txBody>
-          <a:bodyPr/>
-          <a:lstStyle/>
-          <a:p>
-            <a:r>
-              <a:rPr lang="de-CH" dirty="0" smtClean="0"/>
-              <a:t>Architektur</a:t>
-            </a:r>
-            <a:endParaRPr lang="de-CH" dirty="0"/>
-          </a:p>
-        </p:txBody>
-      </p:sp>
-      <p:sp>
-        <p:nvSpPr>
-          <p:cNvPr id="6" name="Untertitel 5"/>
-          <p:cNvSpPr>
-            <a:spLocks noGrp="1"/>
-          </p:cNvSpPr>
-          <p:nvPr>
-            <p:ph type="subTitle" idx="1"/>
-          </p:nvPr>
-        </p:nvSpPr>
-        <p:spPr/>
-        <p:txBody>
-          <a:bodyPr/>
-          <a:lstStyle/>
-          <a:p>
-            <a:endParaRPr lang="de-CH" dirty="0"/>
-          </a:p>
-        </p:txBody>
-      </p:sp>
-    </p:spTree>
-    <p:extLst>
-      <p:ext uri="{BB962C8B-B14F-4D97-AF65-F5344CB8AC3E}">
-        <p14:creationId xmlns:p14="http://schemas.microsoft.com/office/powerpoint/2010/main" val="895469015"/>
-      </p:ext>
-    </p:extLst>
-  </p:cSld>
-  <p:clrMapOvr>
-    <a:masterClrMapping/>
-  </p:clrMapOvr>
-  <p:timing>
-    <p:tnLst>
-      <p:par>
-        <p:cTn id="1" dur="indefinite" restart="never" nodeType="tmRoot"/>
-      </p:par>
-    </p:tnLst>
-  </p:timing>
-</p:sld>
-</file>
-
-<file path=ppt/slides/slide6.xml><?xml version="1.0" encoding="utf-8"?>
+<file path=ppt/slides/slide4.xml><?xml version="1.0" encoding="utf-8"?>
 <p:sld xmlns:a="http://schemas.openxmlformats.org/drawingml/2006/main" xmlns:r="http://schemas.openxmlformats.org/officeDocument/2006/relationships" xmlns:p="http://schemas.openxmlformats.org/presentationml/2006/main">
   <p:cSld>
     <p:spTree>
@@ -7981,6 +7781,129 @@
           </a:extLst>
         </p:spPr>
       </p:pic>
+      <p:pic>
+        <p:nvPicPr>
+          <p:cNvPr id="1026" name="Picture 2" descr="png file related to html5 icon html5 logo icon html5"/>
+          <p:cNvPicPr>
+            <a:picLocks noChangeAspect="1" noChangeArrowheads="1"/>
+          </p:cNvPicPr>
+          <p:nvPr/>
+        </p:nvPicPr>
+        <p:blipFill>
+          <a:blip r:embed="rId5">
+            <a:extLst>
+              <a:ext uri="{28A0092B-C50C-407E-A947-70E740481C1C}">
+                <a14:useLocalDpi xmlns:a14="http://schemas.microsoft.com/office/drawing/2010/main" val="0"/>
+              </a:ext>
+            </a:extLst>
+          </a:blip>
+          <a:srcRect/>
+          <a:stretch>
+            <a:fillRect/>
+          </a:stretch>
+        </p:blipFill>
+        <p:spPr bwMode="auto">
+          <a:xfrm>
+            <a:off x="238568" y="1405543"/>
+            <a:ext cx="1496580" cy="1496580"/>
+          </a:xfrm>
+          <a:prstGeom prst="rect">
+            <a:avLst/>
+          </a:prstGeom>
+          <a:noFill/>
+          <a:extLst>
+            <a:ext uri="{909E8E84-426E-40DD-AFC4-6F175D3DCCD1}">
+              <a14:hiddenFill xmlns:a14="http://schemas.microsoft.com/office/drawing/2010/main">
+                <a:solidFill>
+                  <a:srgbClr val="FFFFFF"/>
+                </a:solidFill>
+              </a14:hiddenFill>
+            </a:ext>
+          </a:extLst>
+        </p:spPr>
+      </p:pic>
+      <p:pic>
+        <p:nvPicPr>
+          <p:cNvPr id="1028" name="Picture 4" descr="benefits of using bootstrap"/>
+          <p:cNvPicPr>
+            <a:picLocks noChangeAspect="1" noChangeArrowheads="1"/>
+          </p:cNvPicPr>
+          <p:nvPr/>
+        </p:nvPicPr>
+        <p:blipFill>
+          <a:blip r:embed="rId6">
+            <a:extLst>
+              <a:ext uri="{28A0092B-C50C-407E-A947-70E740481C1C}">
+                <a14:useLocalDpi xmlns:a14="http://schemas.microsoft.com/office/drawing/2010/main" val="0"/>
+              </a:ext>
+            </a:extLst>
+          </a:blip>
+          <a:srcRect/>
+          <a:stretch>
+            <a:fillRect/>
+          </a:stretch>
+        </p:blipFill>
+        <p:spPr bwMode="auto">
+          <a:xfrm>
+            <a:off x="673226" y="4411957"/>
+            <a:ext cx="2275610" cy="1137805"/>
+          </a:xfrm>
+          <a:prstGeom prst="rect">
+            <a:avLst/>
+          </a:prstGeom>
+          <a:noFill/>
+          <a:extLst>
+            <a:ext uri="{909E8E84-426E-40DD-AFC4-6F175D3DCCD1}">
+              <a14:hiddenFill xmlns:a14="http://schemas.microsoft.com/office/drawing/2010/main">
+                <a:solidFill>
+                  <a:srgbClr val="FFFFFF"/>
+                </a:solidFill>
+              </a14:hiddenFill>
+            </a:ext>
+          </a:extLst>
+        </p:spPr>
+      </p:pic>
+      <p:pic>
+        <p:nvPicPr>
+          <p:cNvPr id="1030" name="Picture 6" descr="AngularJS by AbhishekGhosh"/>
+          <p:cNvPicPr>
+            <a:picLocks noChangeAspect="1" noChangeArrowheads="1"/>
+          </p:cNvPicPr>
+          <p:nvPr/>
+        </p:nvPicPr>
+        <p:blipFill>
+          <a:blip r:embed="rId7">
+            <a:extLst>
+              <a:ext uri="{28A0092B-C50C-407E-A947-70E740481C1C}">
+                <a14:useLocalDpi xmlns:a14="http://schemas.microsoft.com/office/drawing/2010/main" val="0"/>
+              </a:ext>
+            </a:extLst>
+          </a:blip>
+          <a:srcRect/>
+          <a:stretch>
+            <a:fillRect/>
+          </a:stretch>
+        </p:blipFill>
+        <p:spPr bwMode="auto">
+          <a:xfrm>
+            <a:off x="2361390" y="1592817"/>
+            <a:ext cx="1273494" cy="1273494"/>
+          </a:xfrm>
+          <a:prstGeom prst="rect">
+            <a:avLst/>
+          </a:prstGeom>
+          <a:noFill/>
+          <a:extLst>
+            <a:ext uri="{909E8E84-426E-40DD-AFC4-6F175D3DCCD1}">
+              <a14:hiddenFill xmlns:a14="http://schemas.microsoft.com/office/drawing/2010/main">
+                <a:solidFill>
+                  <a:srgbClr val="FFFFFF"/>
+                </a:solidFill>
+              </a14:hiddenFill>
+            </a:ext>
+          </a:extLst>
+        </p:spPr>
+      </p:pic>
     </p:spTree>
     <p:extLst>
       <p:ext uri="{BB962C8B-B14F-4D97-AF65-F5344CB8AC3E}">
@@ -8001,7 +7924,7 @@
 </p:sld>
 </file>
 
-<file path=ppt/slides/slide7.xml><?xml version="1.0" encoding="utf-8"?>
+<file path=ppt/slides/slide5.xml><?xml version="1.0" encoding="utf-8"?>
 <p:sld xmlns:a="http://schemas.openxmlformats.org/drawingml/2006/main" xmlns:r="http://schemas.openxmlformats.org/officeDocument/2006/relationships" xmlns:p="http://schemas.openxmlformats.org/presentationml/2006/main">
   <p:cSld>
     <p:spTree>
@@ -8080,6 +8003,150 @@
 </p:sld>
 </file>
 
+<file path=ppt/slides/slide6.xml><?xml version="1.0" encoding="utf-8"?>
+<p:sld xmlns:a="http://schemas.openxmlformats.org/drawingml/2006/main" xmlns:r="http://schemas.openxmlformats.org/officeDocument/2006/relationships" xmlns:p="http://schemas.openxmlformats.org/presentationml/2006/main">
+  <p:cSld>
+    <p:spTree>
+      <p:nvGrpSpPr>
+        <p:cNvPr id="1" name=""/>
+        <p:cNvGrpSpPr/>
+        <p:nvPr/>
+      </p:nvGrpSpPr>
+      <p:grpSpPr>
+        <a:xfrm>
+          <a:off x="0" y="0"/>
+          <a:ext cx="0" cy="0"/>
+          <a:chOff x="0" y="0"/>
+          <a:chExt cx="0" cy="0"/>
+        </a:xfrm>
+      </p:grpSpPr>
+      <p:sp>
+        <p:nvSpPr>
+          <p:cNvPr id="2" name="Content Placeholder 1"/>
+          <p:cNvSpPr>
+            <a:spLocks noGrp="1"/>
+          </p:cNvSpPr>
+          <p:nvPr>
+            <p:ph sz="half" idx="1"/>
+          </p:nvPr>
+        </p:nvSpPr>
+        <p:spPr/>
+        <p:txBody>
+          <a:bodyPr/>
+          <a:lstStyle/>
+          <a:p>
+            <a:endParaRPr lang="de-CH"/>
+          </a:p>
+        </p:txBody>
+      </p:sp>
+      <p:sp>
+        <p:nvSpPr>
+          <p:cNvPr id="3" name="Title 2"/>
+          <p:cNvSpPr>
+            <a:spLocks noGrp="1"/>
+          </p:cNvSpPr>
+          <p:nvPr>
+            <p:ph type="ctrTitle"/>
+          </p:nvPr>
+        </p:nvSpPr>
+        <p:spPr/>
+        <p:txBody>
+          <a:bodyPr/>
+          <a:lstStyle/>
+          <a:p>
+            <a:r>
+              <a:rPr lang="en-US" dirty="0" smtClean="0"/>
+              <a:t>Backend – Security</a:t>
+            </a:r>
+            <a:endParaRPr lang="de-CH" dirty="0"/>
+          </a:p>
+        </p:txBody>
+      </p:sp>
+    </p:spTree>
+    <p:extLst>
+      <p:ext uri="{BB962C8B-B14F-4D97-AF65-F5344CB8AC3E}">
+        <p14:creationId xmlns:p14="http://schemas.microsoft.com/office/powerpoint/2010/main" val="3805313728"/>
+      </p:ext>
+    </p:extLst>
+  </p:cSld>
+  <p:clrMapOvr>
+    <a:masterClrMapping/>
+  </p:clrMapOvr>
+</p:sld>
+</file>
+
+<file path=ppt/slides/slide7.xml><?xml version="1.0" encoding="utf-8"?>
+<p:sld xmlns:a="http://schemas.openxmlformats.org/drawingml/2006/main" xmlns:r="http://schemas.openxmlformats.org/officeDocument/2006/relationships" xmlns:p="http://schemas.openxmlformats.org/presentationml/2006/main">
+  <p:cSld>
+    <p:spTree>
+      <p:nvGrpSpPr>
+        <p:cNvPr id="1" name=""/>
+        <p:cNvGrpSpPr/>
+        <p:nvPr/>
+      </p:nvGrpSpPr>
+      <p:grpSpPr>
+        <a:xfrm>
+          <a:off x="0" y="0"/>
+          <a:ext cx="0" cy="0"/>
+          <a:chOff x="0" y="0"/>
+          <a:chExt cx="0" cy="0"/>
+        </a:xfrm>
+      </p:grpSpPr>
+      <p:sp>
+        <p:nvSpPr>
+          <p:cNvPr id="2" name="Content Placeholder 1"/>
+          <p:cNvSpPr>
+            <a:spLocks noGrp="1"/>
+          </p:cNvSpPr>
+          <p:nvPr>
+            <p:ph sz="half" idx="1"/>
+          </p:nvPr>
+        </p:nvSpPr>
+        <p:spPr/>
+        <p:txBody>
+          <a:bodyPr/>
+          <a:lstStyle/>
+          <a:p>
+            <a:endParaRPr lang="de-CH"/>
+          </a:p>
+        </p:txBody>
+      </p:sp>
+      <p:sp>
+        <p:nvSpPr>
+          <p:cNvPr id="3" name="Title 2"/>
+          <p:cNvSpPr>
+            <a:spLocks noGrp="1"/>
+          </p:cNvSpPr>
+          <p:nvPr>
+            <p:ph type="ctrTitle"/>
+          </p:nvPr>
+        </p:nvSpPr>
+        <p:spPr/>
+        <p:txBody>
+          <a:bodyPr/>
+          <a:lstStyle/>
+          <a:p>
+            <a:r>
+              <a:rPr lang="en-US" dirty="0" smtClean="0"/>
+              <a:t>Backend - DB</a:t>
+            </a:r>
+            <a:endParaRPr lang="de-CH" dirty="0"/>
+          </a:p>
+        </p:txBody>
+      </p:sp>
+    </p:spTree>
+    <p:extLst>
+      <p:ext uri="{BB962C8B-B14F-4D97-AF65-F5344CB8AC3E}">
+        <p14:creationId xmlns:p14="http://schemas.microsoft.com/office/powerpoint/2010/main" val="997897787"/>
+      </p:ext>
+    </p:extLst>
+  </p:cSld>
+  <p:clrMapOvr>
+    <a:masterClrMapping/>
+  </p:clrMapOvr>
+</p:sld>
+</file>
+
 <file path=ppt/slides/slide8.xml><?xml version="1.0" encoding="utf-8"?>
 <p:sld xmlns:a="http://schemas.openxmlformats.org/drawingml/2006/main" xmlns:r="http://schemas.openxmlformats.org/officeDocument/2006/relationships" xmlns:p="http://schemas.openxmlformats.org/presentationml/2006/main">
   <p:cSld>
@@ -8099,12 +8166,12 @@
       </p:grpSpPr>
       <p:sp>
         <p:nvSpPr>
-          <p:cNvPr id="3" name="Titel 2"/>
+          <p:cNvPr id="2" name="Content Placeholder 1"/>
           <p:cNvSpPr>
             <a:spLocks noGrp="1"/>
           </p:cNvSpPr>
           <p:nvPr>
-            <p:ph type="ctrTitle"/>
+            <p:ph sz="half" idx="1"/>
           </p:nvPr>
         </p:nvSpPr>
         <p:spPr/>
@@ -8112,70 +8179,115 @@
           <a:bodyPr/>
           <a:lstStyle/>
           <a:p>
+            <a:endParaRPr lang="de-CH"/>
+          </a:p>
+        </p:txBody>
+      </p:sp>
+      <p:sp>
+        <p:nvSpPr>
+          <p:cNvPr id="3" name="Title 2"/>
+          <p:cNvSpPr>
+            <a:spLocks noGrp="1"/>
+          </p:cNvSpPr>
+          <p:nvPr>
+            <p:ph type="ctrTitle"/>
+          </p:nvPr>
+        </p:nvSpPr>
+        <p:spPr/>
+        <p:txBody>
+          <a:bodyPr/>
+          <a:lstStyle/>
+          <a:p>
+            <a:r>
+              <a:rPr lang="en-US" dirty="0" smtClean="0"/>
+              <a:t>Frontend - Testing</a:t>
+            </a:r>
             <a:endParaRPr lang="de-CH" dirty="0"/>
           </a:p>
         </p:txBody>
       </p:sp>
-      <p:pic>
-        <p:nvPicPr>
-          <p:cNvPr id="1026" name="Picture 2" descr="http://www.fotoalbumshop.de/blog/wp-content/uploads/spezifische_fragen.jpg"/>
-          <p:cNvPicPr>
-            <a:picLocks noGrp="1" noChangeAspect="1" noChangeArrowheads="1"/>
-          </p:cNvPicPr>
-          <p:nvPr>
-            <p:ph sz="half" idx="1"/>
-          </p:nvPr>
-        </p:nvPicPr>
-        <p:blipFill>
-          <a:blip r:embed="rId3">
-            <a:extLst>
-              <a:ext uri="{28A0092B-C50C-407E-A947-70E740481C1C}">
-                <a14:useLocalDpi xmlns:a14="http://schemas.microsoft.com/office/drawing/2010/main" val="0"/>
-              </a:ext>
-            </a:extLst>
-          </a:blip>
-          <a:srcRect/>
-          <a:stretch>
-            <a:fillRect/>
-          </a:stretch>
-        </p:blipFill>
-        <p:spPr bwMode="auto">
-          <a:xfrm>
-            <a:off x="962025" y="1716088"/>
-            <a:ext cx="7112000" cy="3289300"/>
-          </a:xfrm>
-          <a:prstGeom prst="rect">
-            <a:avLst/>
-          </a:prstGeom>
-          <a:noFill/>
-          <a:extLst>
-            <a:ext uri="{909E8E84-426E-40DD-AFC4-6F175D3DCCD1}">
-              <a14:hiddenFill xmlns:a14="http://schemas.microsoft.com/office/drawing/2010/main">
-                <a:solidFill>
-                  <a:srgbClr val="FFFFFF"/>
-                </a:solidFill>
-              </a14:hiddenFill>
-            </a:ext>
-          </a:extLst>
-        </p:spPr>
-      </p:pic>
     </p:spTree>
     <p:extLst>
       <p:ext uri="{BB962C8B-B14F-4D97-AF65-F5344CB8AC3E}">
-        <p14:creationId xmlns:p14="http://schemas.microsoft.com/office/powerpoint/2010/main" val="2672802321"/>
+        <p14:creationId xmlns:p14="http://schemas.microsoft.com/office/powerpoint/2010/main" val="764413094"/>
       </p:ext>
     </p:extLst>
   </p:cSld>
   <p:clrMapOvr>
     <a:masterClrMapping/>
   </p:clrMapOvr>
-  <p:timing>
-    <p:tnLst>
-      <p:par>
-        <p:cTn id="1" dur="indefinite" restart="never" nodeType="tmRoot"/>
-      </p:par>
-    </p:tnLst>
-  </p:timing>
+</p:sld>
+</file>
+
+<file path=ppt/slides/slide9.xml><?xml version="1.0" encoding="utf-8"?>
+<p:sld xmlns:a="http://schemas.openxmlformats.org/drawingml/2006/main" xmlns:r="http://schemas.openxmlformats.org/officeDocument/2006/relationships" xmlns:p="http://schemas.openxmlformats.org/presentationml/2006/main">
+  <p:cSld>
+    <p:spTree>
+      <p:nvGrpSpPr>
+        <p:cNvPr id="1" name=""/>
+        <p:cNvGrpSpPr/>
+        <p:nvPr/>
+      </p:nvGrpSpPr>
+      <p:grpSpPr>
+        <a:xfrm>
+          <a:off x="0" y="0"/>
+          <a:ext cx="0" cy="0"/>
+          <a:chOff x="0" y="0"/>
+          <a:chExt cx="0" cy="0"/>
+        </a:xfrm>
+      </p:grpSpPr>
+      <p:sp>
+        <p:nvSpPr>
+          <p:cNvPr id="2" name="Content Placeholder 1"/>
+          <p:cNvSpPr>
+            <a:spLocks noGrp="1"/>
+          </p:cNvSpPr>
+          <p:nvPr>
+            <p:ph sz="half" idx="1"/>
+          </p:nvPr>
+        </p:nvSpPr>
+        <p:spPr/>
+        <p:txBody>
+          <a:bodyPr/>
+          <a:lstStyle/>
+          <a:p>
+            <a:endParaRPr lang="de-CH"/>
+          </a:p>
+        </p:txBody>
+      </p:sp>
+      <p:sp>
+        <p:nvSpPr>
+          <p:cNvPr id="3" name="Title 2"/>
+          <p:cNvSpPr>
+            <a:spLocks noGrp="1"/>
+          </p:cNvSpPr>
+          <p:nvPr>
+            <p:ph type="ctrTitle"/>
+          </p:nvPr>
+        </p:nvSpPr>
+        <p:spPr/>
+        <p:txBody>
+          <a:bodyPr/>
+          <a:lstStyle/>
+          <a:p>
+            <a:r>
+              <a:rPr lang="en-US" dirty="0" smtClean="0"/>
+              <a:t>Frontend - ??</a:t>
+            </a:r>
+            <a:endParaRPr lang="de-CH" dirty="0"/>
+          </a:p>
+        </p:txBody>
+      </p:sp>
+    </p:spTree>
+    <p:extLst>
+      <p:ext uri="{BB962C8B-B14F-4D97-AF65-F5344CB8AC3E}">
+        <p14:creationId xmlns:p14="http://schemas.microsoft.com/office/powerpoint/2010/main" val="3877729246"/>
+      </p:ext>
+    </p:extLst>
+  </p:cSld>
+  <p:clrMapOvr>
+    <a:masterClrMapping/>
+  </p:clrMapOvr>
 </p:sld>
 </file>
 
@@ -9010,6 +9122,21 @@
 </file>
 
 <file path=customXml/item1.xml><?xml version="1.0" encoding="utf-8"?>
+<p:properties xmlns:p="http://schemas.microsoft.com/office/2006/metadata/properties" xmlns:xsi="http://www.w3.org/2001/XMLSchema-instance" xmlns:pc="http://schemas.microsoft.com/office/infopath/2007/PartnerControls">
+  <documentManagement/>
+</p:properties>
+</file>
+
+<file path=customXml/item2.xml><?xml version="1.0" encoding="utf-8"?>
+<?mso-contentType ?>
+<FormTemplates xmlns="http://schemas.microsoft.com/sharepoint/v3/contenttype/forms">
+  <Display>DocumentLibraryForm</Display>
+  <Edit>DocumentLibraryForm</Edit>
+  <New>DocumentLibraryForm</New>
+</FormTemplates>
+</file>
+
+<file path=customXml/item3.xml><?xml version="1.0" encoding="utf-8"?>
 <ct:contentTypeSchema xmlns:ct="http://schemas.microsoft.com/office/2006/metadata/contentType" xmlns:ma="http://schemas.microsoft.com/office/2006/metadata/properties/metaAttributes" ct:_="" ma:_="" ma:contentTypeName="Dokument" ma:contentTypeID="0x010100D6F20A37C6110E47868E927E48D0A54D" ma:contentTypeVersion="0" ma:contentTypeDescription="Ein neues Dokument erstellen." ma:contentTypeScope="" ma:versionID="625138f5850c531513664869d20c2674">
   <xsd:schema xmlns:xsd="http://www.w3.org/2001/XMLSchema" xmlns:p="http://schemas.microsoft.com/office/2006/metadata/properties" targetNamespace="http://schemas.microsoft.com/office/2006/metadata/properties" ma:root="true" ma:fieldsID="246f02dd96380beb4f7cdcce14d77fd6">
     <xsd:element name="properties">
@@ -9058,32 +9185,16 @@
 </ct:contentTypeSchema>
 </file>
 
-<file path=customXml/item2.xml><?xml version="1.0" encoding="utf-8"?>
-<?mso-contentType ?>
-<FormTemplates xmlns="http://schemas.microsoft.com/sharepoint/v3/contenttype/forms">
-  <Display>DocumentLibraryForm</Display>
-  <Edit>DocumentLibraryForm</Edit>
-  <New>DocumentLibraryForm</New>
-</FormTemplates>
-</file>
-
-<file path=customXml/item3.xml><?xml version="1.0" encoding="utf-8"?>
-<p:properties xmlns:p="http://schemas.microsoft.com/office/2006/metadata/properties" xmlns:xsi="http://www.w3.org/2001/XMLSchema-instance" xmlns:pc="http://schemas.microsoft.com/office/infopath/2007/PartnerControls">
-  <documentManagement/>
-</p:properties>
-</file>
-
 <file path=customXml/itemProps1.xml><?xml version="1.0" encoding="utf-8"?>
-<ds:datastoreItem xmlns:ds="http://schemas.openxmlformats.org/officeDocument/2006/customXml" ds:itemID="{D9E2C93D-B182-4182-AA21-5DF1FE2EF838}">
+<ds:datastoreItem xmlns:ds="http://schemas.openxmlformats.org/officeDocument/2006/customXml" ds:itemID="{96591048-6F15-48C6-9650-9BFF3E56974F}">
   <ds:schemaRefs>
-    <ds:schemaRef ds:uri="http://schemas.microsoft.com/office/2006/metadata/contentType"/>
-    <ds:schemaRef ds:uri="http://schemas.microsoft.com/office/2006/metadata/properties/metaAttributes"/>
-    <ds:schemaRef ds:uri="http://www.w3.org/2001/XMLSchema"/>
+    <ds:schemaRef ds:uri="http://purl.org/dc/terms/"/>
+    <ds:schemaRef ds:uri="http://schemas.openxmlformats.org/package/2006/metadata/core-properties"/>
+    <ds:schemaRef ds:uri="http://schemas.microsoft.com/office/2006/documentManagement/types"/>
+    <ds:schemaRef ds:uri="http://purl.org/dc/elements/1.1/"/>
     <ds:schemaRef ds:uri="http://schemas.microsoft.com/office/2006/metadata/properties"/>
-    <ds:schemaRef ds:uri="http://schemas.openxmlformats.org/package/2006/metadata/core-properties"/>
-    <ds:schemaRef ds:uri="http://purl.org/dc/elements/1.1/"/>
-    <ds:schemaRef ds:uri="http://purl.org/dc/terms/"/>
-    <ds:schemaRef ds:uri="http://schemas.microsoft.com/office/internal/2005/internalDocumentation"/>
+    <ds:schemaRef ds:uri="http://www.w3.org/XML/1998/namespace"/>
+    <ds:schemaRef ds:uri="http://purl.org/dc/dcmitype/"/>
   </ds:schemaRefs>
 </ds:datastoreItem>
 </file>
@@ -9097,16 +9208,16 @@
 </file>
 
 <file path=customXml/itemProps3.xml><?xml version="1.0" encoding="utf-8"?>
-<ds:datastoreItem xmlns:ds="http://schemas.openxmlformats.org/officeDocument/2006/customXml" ds:itemID="{96591048-6F15-48C6-9650-9BFF3E56974F}">
+<ds:datastoreItem xmlns:ds="http://schemas.openxmlformats.org/officeDocument/2006/customXml" ds:itemID="{D9E2C93D-B182-4182-AA21-5DF1FE2EF838}">
   <ds:schemaRefs>
+    <ds:schemaRef ds:uri="http://schemas.microsoft.com/office/2006/metadata/contentType"/>
+    <ds:schemaRef ds:uri="http://schemas.microsoft.com/office/2006/metadata/properties/metaAttributes"/>
+    <ds:schemaRef ds:uri="http://www.w3.org/2001/XMLSchema"/>
+    <ds:schemaRef ds:uri="http://schemas.microsoft.com/office/2006/metadata/properties"/>
+    <ds:schemaRef ds:uri="http://schemas.openxmlformats.org/package/2006/metadata/core-properties"/>
+    <ds:schemaRef ds:uri="http://purl.org/dc/elements/1.1/"/>
     <ds:schemaRef ds:uri="http://purl.org/dc/terms/"/>
-    <ds:schemaRef ds:uri="http://schemas.openxmlformats.org/package/2006/metadata/core-properties"/>
-    <ds:schemaRef ds:uri="http://purl.org/dc/dcmitype/"/>
-    <ds:schemaRef ds:uri="http://purl.org/dc/elements/1.1/"/>
-    <ds:schemaRef ds:uri="http://schemas.microsoft.com/office/2006/documentManagement/types"/>
-    <ds:schemaRef ds:uri="http://schemas.microsoft.com/office/2006/metadata/properties"/>
-    <ds:schemaRef ds:uri="http://www.w3.org/XML/1998/namespace"/>
-    <ds:schemaRef ds:uri="http://schemas.microsoft.com/office/infopath/2007/PartnerControls"/>
+    <ds:schemaRef ds:uri="http://schemas.microsoft.com/office/internal/2005/internalDocumentation"/>
   </ds:schemaRefs>
 </ds:datastoreItem>
 </file>
</xml_diff>

<commit_message>
kk: Presi mit JsCs erweitert
</commit_message>
<xml_diff>
--- a/Presentation/Präsentation Integrationsprojekt.pptx
+++ b/Presentation/Präsentation Integrationsprojekt.pptx
@@ -152,7 +152,7 @@
   </p:defaultTextStyle>
   <p:extLst>
     <p:ext uri="{EFAFB233-063F-42B5-8137-9DF3F51BA10A}">
-      <p15:sldGuideLst xmlns="" xmlns:p15="http://schemas.microsoft.com/office/powerpoint/2012/main">
+      <p15:sldGuideLst xmlns:p15="http://schemas.microsoft.com/office/powerpoint/2012/main" xmlns="">
         <p15:guide id="1" orient="horz" pos="2160">
           <p15:clr>
             <a:srgbClr val="A4A3A4"/>
@@ -166,7 +166,7 @@
       </p15:sldGuideLst>
     </p:ext>
     <p:ext uri="{2D200454-40CA-4A62-9FC3-DE9A4176ACB9}">
-      <p15:notesGuideLst xmlns="" xmlns:p15="http://schemas.microsoft.com/office/powerpoint/2012/main">
+      <p15:notesGuideLst xmlns:p15="http://schemas.microsoft.com/office/powerpoint/2012/main" xmlns="">
         <p15:guide id="1" orient="horz" pos="3108">
           <p15:clr>
             <a:srgbClr val="A4A3A4"/>
@@ -8624,8 +8624,8 @@
         </p:blipFill>
         <p:spPr>
           <a:xfrm>
-            <a:off x="4963086" y="3121491"/>
-            <a:ext cx="3035539" cy="2667954"/>
+            <a:off x="4825621" y="3618459"/>
+            <a:ext cx="2701850" cy="2374673"/>
           </a:xfrm>
           <a:prstGeom prst="rect">
             <a:avLst/>
@@ -8648,7 +8648,7 @@
         </p:blipFill>
         <p:spPr>
           <a:xfrm>
-            <a:off x="602458" y="3121491"/>
+            <a:off x="743548" y="3154078"/>
             <a:ext cx="2959100" cy="2743200"/>
           </a:xfrm>
           <a:prstGeom prst="rect">
@@ -8672,8 +8672,32 @@
         </p:blipFill>
         <p:spPr>
           <a:xfrm>
-            <a:off x="4847887" y="900000"/>
+            <a:off x="4272830" y="1714752"/>
             <a:ext cx="3472185" cy="1548595"/>
+          </a:xfrm>
+          <a:prstGeom prst="rect">
+            <a:avLst/>
+          </a:prstGeom>
+        </p:spPr>
+      </p:pic>
+      <p:pic>
+        <p:nvPicPr>
+          <p:cNvPr id="2" name="Bild 1"/>
+          <p:cNvPicPr>
+            <a:picLocks noChangeAspect="1"/>
+          </p:cNvPicPr>
+          <p:nvPr/>
+        </p:nvPicPr>
+        <p:blipFill>
+          <a:blip r:embed="rId6"/>
+          <a:stretch>
+            <a:fillRect/>
+          </a:stretch>
+        </p:blipFill>
+        <p:spPr>
+          <a:xfrm>
+            <a:off x="6469236" y="356464"/>
+            <a:ext cx="1850836" cy="1850836"/>
           </a:xfrm>
           <a:prstGeom prst="rect">
             <a:avLst/>

</xml_diff>

<commit_message>
Added Grunt Tasks, Testing
</commit_message>
<xml_diff>
--- a/Presentation/Präsentation Integrationsprojekt.pptx
+++ b/Presentation/Präsentation Integrationsprojekt.pptx
@@ -5,10 +5,10 @@
     <p:sldMasterId id="2147483669" r:id="rId4"/>
   </p:sldMasterIdLst>
   <p:notesMasterIdLst>
-    <p:notesMasterId r:id="rId16"/>
+    <p:notesMasterId r:id="rId17"/>
   </p:notesMasterIdLst>
   <p:handoutMasterIdLst>
-    <p:handoutMasterId r:id="rId17"/>
+    <p:handoutMasterId r:id="rId18"/>
   </p:handoutMasterIdLst>
   <p:sldIdLst>
     <p:sldId id="259" r:id="rId5"/>
@@ -16,12 +16,13 @@
     <p:sldId id="264" r:id="rId7"/>
     <p:sldId id="266" r:id="rId8"/>
     <p:sldId id="274" r:id="rId9"/>
-    <p:sldId id="276" r:id="rId10"/>
-    <p:sldId id="277" r:id="rId11"/>
-    <p:sldId id="278" r:id="rId12"/>
-    <p:sldId id="279" r:id="rId13"/>
-    <p:sldId id="267" r:id="rId14"/>
-    <p:sldId id="273" r:id="rId15"/>
+    <p:sldId id="277" r:id="rId10"/>
+    <p:sldId id="276" r:id="rId11"/>
+    <p:sldId id="280" r:id="rId12"/>
+    <p:sldId id="278" r:id="rId13"/>
+    <p:sldId id="279" r:id="rId14"/>
+    <p:sldId id="267" r:id="rId15"/>
+    <p:sldId id="273" r:id="rId16"/>
   </p:sldIdLst>
   <p:sldSz cx="9144000" cy="6858000" type="screen4x3"/>
   <p:notesSz cx="6735763" cy="9866313"/>
@@ -152,7 +153,7 @@
   </p:defaultTextStyle>
   <p:extLst>
     <p:ext uri="{EFAFB233-063F-42B5-8137-9DF3F51BA10A}">
-      <p15:sldGuideLst xmlns:p15="http://schemas.microsoft.com/office/powerpoint/2012/main">
+      <p15:sldGuideLst xmlns:p15="http://schemas.microsoft.com/office/powerpoint/2012/main" xmlns="">
         <p15:guide id="1" orient="horz" pos="2160">
           <p15:clr>
             <a:srgbClr val="A4A3A4"/>
@@ -166,7 +167,7 @@
       </p15:sldGuideLst>
     </p:ext>
     <p:ext uri="{2D200454-40CA-4A62-9FC3-DE9A4176ACB9}">
-      <p15:notesGuideLst xmlns:p15="http://schemas.microsoft.com/office/powerpoint/2012/main">
+      <p15:notesGuideLst xmlns:p15="http://schemas.microsoft.com/office/powerpoint/2012/main" xmlns="">
         <p15:guide id="1" orient="horz" pos="3108">
           <p15:clr>
             <a:srgbClr val="A4A3A4"/>
@@ -265,7 +266,8 @@
           <a:p>
             <a:fld id="{EFA0D184-D464-48E9-9CA0-A94E873F6C2C}" type="datetimeFigureOut">
               <a:rPr lang="de-CH" smtClean="0"/>
-              <a:t>29.09.2015</a:t>
+              <a:pPr/>
+              <a:t>30.09.2015</a:t>
             </a:fld>
             <a:endParaRPr lang="de-CH"/>
           </a:p>
@@ -331,7 +333,8 @@
           <a:p>
             <a:fld id="{5F377753-DB7C-4FA7-98FC-17681D88797A}" type="slidenum">
               <a:rPr lang="de-CH" smtClean="0"/>
-              <a:t>‹#›</a:t>
+              <a:pPr/>
+              <a:t>‹Nr.›</a:t>
             </a:fld>
             <a:endParaRPr lang="de-CH"/>
           </a:p>
@@ -340,7 +343,7 @@
     </p:spTree>
     <p:extLst>
       <p:ext uri="{BB962C8B-B14F-4D97-AF65-F5344CB8AC3E}">
-        <p14:creationId xmlns:p14="http://schemas.microsoft.com/office/powerpoint/2010/main" val="1961596217"/>
+        <p14:creationId xmlns:p14="http://schemas.microsoft.com/office/powerpoint/2010/main" xmlns="" val="1961596217"/>
       </p:ext>
     </p:extLst>
   </p:cSld>
@@ -430,7 +433,8 @@
           <a:p>
             <a:fld id="{5AF2B663-2BA9-4D7E-8201-5DE4109E1EDD}" type="datetimeFigureOut">
               <a:rPr lang="de-CH" smtClean="0"/>
-              <a:t>29.09.2015</a:t>
+              <a:pPr/>
+              <a:t>30.09.2015</a:t>
             </a:fld>
             <a:endParaRPr lang="de-CH"/>
           </a:p>
@@ -589,7 +593,8 @@
           <a:p>
             <a:fld id="{37E44704-8E6D-4CF2-8CFA-A0F7BC751896}" type="slidenum">
               <a:rPr lang="de-CH" smtClean="0"/>
-              <a:t>‹#›</a:t>
+              <a:pPr/>
+              <a:t>‹Nr.›</a:t>
             </a:fld>
             <a:endParaRPr lang="de-CH"/>
           </a:p>
@@ -598,7 +603,7 @@
     </p:spTree>
     <p:extLst>
       <p:ext uri="{BB962C8B-B14F-4D97-AF65-F5344CB8AC3E}">
-        <p14:creationId xmlns:p14="http://schemas.microsoft.com/office/powerpoint/2010/main" val="418899431"/>
+        <p14:creationId xmlns:p14="http://schemas.microsoft.com/office/powerpoint/2010/main" xmlns="" val="418899431"/>
       </p:ext>
     </p:extLst>
   </p:cSld>
@@ -767,6 +772,7 @@
           <a:p>
             <a:fld id="{37E44704-8E6D-4CF2-8CFA-A0F7BC751896}" type="slidenum">
               <a:rPr lang="de-CH" smtClean="0"/>
+              <a:pPr/>
               <a:t>2</a:t>
             </a:fld>
             <a:endParaRPr lang="de-CH"/>
@@ -776,7 +782,7 @@
     </p:spTree>
     <p:extLst>
       <p:ext uri="{BB962C8B-B14F-4D97-AF65-F5344CB8AC3E}">
-        <p14:creationId xmlns:p14="http://schemas.microsoft.com/office/powerpoint/2010/main" val="3263484599"/>
+        <p14:creationId xmlns:p14="http://schemas.microsoft.com/office/powerpoint/2010/main" xmlns="" val="3263484599"/>
       </p:ext>
     </p:extLst>
   </p:cSld>
@@ -830,6 +836,76 @@
           <a:bodyPr/>
           <a:lstStyle/>
           <a:p>
+            <a:pPr marL="0" marR="0" indent="0" algn="l" defTabSz="914400" rtl="0" eaLnBrk="1" fontAlgn="auto" latinLnBrk="0" hangingPunct="1">
+              <a:lnSpc>
+                <a:spcPct val="100000"/>
+              </a:lnSpc>
+              <a:spcBef>
+                <a:spcPts val="0"/>
+              </a:spcBef>
+              <a:spcAft>
+                <a:spcPts val="0"/>
+              </a:spcAft>
+              <a:buClrTx/>
+              <a:buSzTx/>
+              <a:buFontTx/>
+              <a:buNone/>
+              <a:tabLst/>
+              <a:defRPr/>
+            </a:pPr>
+            <a:r>
+              <a:rPr lang="de-CH" dirty="0" smtClean="0"/>
+              <a:t>Frontend:</a:t>
+            </a:r>
+            <a:r>
+              <a:rPr lang="de-CH" baseline="0" dirty="0" smtClean="0"/>
+              <a:t> </a:t>
+            </a:r>
+            <a:r>
+              <a:rPr lang="de-CH" dirty="0" err="1" smtClean="0"/>
+              <a:t>Dani</a:t>
+            </a:r>
+            <a:r>
+              <a:rPr lang="de-CH" dirty="0" smtClean="0"/>
+              <a:t> / Kiwi</a:t>
+            </a:r>
+          </a:p>
+          <a:p>
+            <a:pPr marL="0" marR="0" indent="0" algn="l" defTabSz="914400" rtl="0" eaLnBrk="1" fontAlgn="auto" latinLnBrk="0" hangingPunct="1">
+              <a:lnSpc>
+                <a:spcPct val="100000"/>
+              </a:lnSpc>
+              <a:spcBef>
+                <a:spcPts val="0"/>
+              </a:spcBef>
+              <a:spcAft>
+                <a:spcPts val="0"/>
+              </a:spcAft>
+              <a:buClrTx/>
+              <a:buSzTx/>
+              <a:buFontTx/>
+              <a:buNone/>
+              <a:tabLst/>
+              <a:defRPr/>
+            </a:pPr>
+            <a:r>
+              <a:rPr lang="de-CH" dirty="0" err="1" smtClean="0"/>
+              <a:t>Testing</a:t>
+            </a:r>
+            <a:r>
+              <a:rPr lang="de-CH" smtClean="0"/>
+              <a:t>:</a:t>
+            </a:r>
+            <a:r>
+              <a:rPr lang="de-CH" baseline="0" smtClean="0"/>
+              <a:t> Nik</a:t>
+            </a:r>
+            <a:endParaRPr lang="de-CH" dirty="0" smtClean="0"/>
+          </a:p>
+          <a:p>
+            <a:endParaRPr lang="de-CH" dirty="0" smtClean="0"/>
+          </a:p>
+          <a:p>
             <a:endParaRPr lang="de-CH" dirty="0"/>
           </a:p>
         </p:txBody>
@@ -851,6 +927,7 @@
           <a:p>
             <a:fld id="{37E44704-8E6D-4CF2-8CFA-A0F7BC751896}" type="slidenum">
               <a:rPr lang="de-CH" smtClean="0"/>
+              <a:pPr/>
               <a:t>11</a:t>
             </a:fld>
             <a:endParaRPr lang="de-CH"/>
@@ -860,7 +937,92 @@
     </p:spTree>
     <p:extLst>
       <p:ext uri="{BB962C8B-B14F-4D97-AF65-F5344CB8AC3E}">
-        <p14:creationId xmlns:p14="http://schemas.microsoft.com/office/powerpoint/2010/main" val="2647494815"/>
+        <p14:creationId xmlns:p14="http://schemas.microsoft.com/office/powerpoint/2010/main" xmlns="" val="4166537278"/>
+      </p:ext>
+    </p:extLst>
+  </p:cSld>
+  <p:clrMapOvr>
+    <a:masterClrMapping/>
+  </p:clrMapOvr>
+</p:notes>
+</file>
+
+<file path=ppt/notesSlides/notesSlide11.xml><?xml version="1.0" encoding="utf-8"?>
+<p:notes xmlns:a="http://schemas.openxmlformats.org/drawingml/2006/main" xmlns:r="http://schemas.openxmlformats.org/officeDocument/2006/relationships" xmlns:p="http://schemas.openxmlformats.org/presentationml/2006/main">
+  <p:cSld>
+    <p:spTree>
+      <p:nvGrpSpPr>
+        <p:cNvPr id="1" name=""/>
+        <p:cNvGrpSpPr/>
+        <p:nvPr/>
+      </p:nvGrpSpPr>
+      <p:grpSpPr>
+        <a:xfrm>
+          <a:off x="0" y="0"/>
+          <a:ext cx="0" cy="0"/>
+          <a:chOff x="0" y="0"/>
+          <a:chExt cx="0" cy="0"/>
+        </a:xfrm>
+      </p:grpSpPr>
+      <p:sp>
+        <p:nvSpPr>
+          <p:cNvPr id="2" name="Slide Image Placeholder 1"/>
+          <p:cNvSpPr>
+            <a:spLocks noGrp="1" noRot="1" noChangeAspect="1"/>
+          </p:cNvSpPr>
+          <p:nvPr>
+            <p:ph type="sldImg"/>
+          </p:nvPr>
+        </p:nvSpPr>
+        <p:spPr/>
+      </p:sp>
+      <p:sp>
+        <p:nvSpPr>
+          <p:cNvPr id="3" name="Notes Placeholder 2"/>
+          <p:cNvSpPr>
+            <a:spLocks noGrp="1"/>
+          </p:cNvSpPr>
+          <p:nvPr>
+            <p:ph type="body" idx="1"/>
+          </p:nvPr>
+        </p:nvSpPr>
+        <p:spPr/>
+        <p:txBody>
+          <a:bodyPr/>
+          <a:lstStyle/>
+          <a:p>
+            <a:endParaRPr lang="de-CH" dirty="0"/>
+          </a:p>
+        </p:txBody>
+      </p:sp>
+      <p:sp>
+        <p:nvSpPr>
+          <p:cNvPr id="4" name="Slide Number Placeholder 3"/>
+          <p:cNvSpPr>
+            <a:spLocks noGrp="1"/>
+          </p:cNvSpPr>
+          <p:nvPr>
+            <p:ph type="sldNum" sz="quarter" idx="10"/>
+          </p:nvPr>
+        </p:nvSpPr>
+        <p:spPr/>
+        <p:txBody>
+          <a:bodyPr/>
+          <a:lstStyle/>
+          <a:p>
+            <a:fld id="{37E44704-8E6D-4CF2-8CFA-A0F7BC751896}" type="slidenum">
+              <a:rPr lang="de-CH" smtClean="0"/>
+              <a:pPr/>
+              <a:t>12</a:t>
+            </a:fld>
+            <a:endParaRPr lang="de-CH"/>
+          </a:p>
+        </p:txBody>
+      </p:sp>
+    </p:spTree>
+    <p:extLst>
+      <p:ext uri="{BB962C8B-B14F-4D97-AF65-F5344CB8AC3E}">
+        <p14:creationId xmlns:p14="http://schemas.microsoft.com/office/powerpoint/2010/main" xmlns="" val="2647494815"/>
       </p:ext>
     </p:extLst>
   </p:cSld>
@@ -939,6 +1101,7 @@
           <a:p>
             <a:fld id="{37E44704-8E6D-4CF2-8CFA-A0F7BC751896}" type="slidenum">
               <a:rPr lang="de-CH" smtClean="0"/>
+              <a:pPr/>
               <a:t>3</a:t>
             </a:fld>
             <a:endParaRPr lang="de-CH"/>
@@ -948,7 +1111,7 @@
     </p:spTree>
     <p:extLst>
       <p:ext uri="{BB962C8B-B14F-4D97-AF65-F5344CB8AC3E}">
-        <p14:creationId xmlns:p14="http://schemas.microsoft.com/office/powerpoint/2010/main" val="3126661833"/>
+        <p14:creationId xmlns:p14="http://schemas.microsoft.com/office/powerpoint/2010/main" xmlns="" val="3126661833"/>
       </p:ext>
     </p:extLst>
   </p:cSld>
@@ -1027,6 +1190,7 @@
           <a:p>
             <a:fld id="{37E44704-8E6D-4CF2-8CFA-A0F7BC751896}" type="slidenum">
               <a:rPr lang="de-CH" smtClean="0"/>
+              <a:pPr/>
               <a:t>4</a:t>
             </a:fld>
             <a:endParaRPr lang="de-CH"/>
@@ -1036,7 +1200,7 @@
     </p:spTree>
     <p:extLst>
       <p:ext uri="{BB962C8B-B14F-4D97-AF65-F5344CB8AC3E}">
-        <p14:creationId xmlns:p14="http://schemas.microsoft.com/office/powerpoint/2010/main" val="1648529491"/>
+        <p14:creationId xmlns:p14="http://schemas.microsoft.com/office/powerpoint/2010/main" xmlns="" val="1648529491"/>
       </p:ext>
     </p:extLst>
   </p:cSld>
@@ -1128,6 +1292,7 @@
           <a:p>
             <a:fld id="{37E44704-8E6D-4CF2-8CFA-A0F7BC751896}" type="slidenum">
               <a:rPr lang="de-CH" smtClean="0"/>
+              <a:pPr/>
               <a:t>5</a:t>
             </a:fld>
             <a:endParaRPr lang="de-CH"/>
@@ -1137,7 +1302,7 @@
     </p:spTree>
     <p:extLst>
       <p:ext uri="{BB962C8B-B14F-4D97-AF65-F5344CB8AC3E}">
-        <p14:creationId xmlns:p14="http://schemas.microsoft.com/office/powerpoint/2010/main" val="3472197226"/>
+        <p14:creationId xmlns:p14="http://schemas.microsoft.com/office/powerpoint/2010/main" xmlns="" val="3472197226"/>
       </p:ext>
     </p:extLst>
   </p:cSld>
@@ -1193,7 +1358,7 @@
           <a:p>
             <a:r>
               <a:rPr lang="de-CH" dirty="0" smtClean="0"/>
-              <a:t>Nik</a:t>
+              <a:t>Kiwi</a:t>
             </a:r>
             <a:endParaRPr lang="de-CH" dirty="0"/>
           </a:p>
@@ -1216,6 +1381,7 @@
           <a:p>
             <a:fld id="{37E44704-8E6D-4CF2-8CFA-A0F7BC751896}" type="slidenum">
               <a:rPr lang="de-CH" smtClean="0"/>
+              <a:pPr/>
               <a:t>6</a:t>
             </a:fld>
             <a:endParaRPr lang="de-CH"/>
@@ -1225,7 +1391,7 @@
     </p:spTree>
     <p:extLst>
       <p:ext uri="{BB962C8B-B14F-4D97-AF65-F5344CB8AC3E}">
-        <p14:creationId xmlns:p14="http://schemas.microsoft.com/office/powerpoint/2010/main" val="3145156136"/>
+        <p14:creationId xmlns:p14="http://schemas.microsoft.com/office/powerpoint/2010/main" xmlns="" val="1880013933"/>
       </p:ext>
     </p:extLst>
   </p:cSld>
@@ -1281,7 +1447,7 @@
           <a:p>
             <a:r>
               <a:rPr lang="de-CH" dirty="0" smtClean="0"/>
-              <a:t>Kiwi</a:t>
+              <a:t>Nik</a:t>
             </a:r>
             <a:endParaRPr lang="de-CH" dirty="0"/>
           </a:p>
@@ -1304,6 +1470,7 @@
           <a:p>
             <a:fld id="{37E44704-8E6D-4CF2-8CFA-A0F7BC751896}" type="slidenum">
               <a:rPr lang="de-CH" smtClean="0"/>
+              <a:pPr/>
               <a:t>7</a:t>
             </a:fld>
             <a:endParaRPr lang="de-CH"/>
@@ -1313,7 +1480,7 @@
     </p:spTree>
     <p:extLst>
       <p:ext uri="{BB962C8B-B14F-4D97-AF65-F5344CB8AC3E}">
-        <p14:creationId xmlns:p14="http://schemas.microsoft.com/office/powerpoint/2010/main" val="1880013933"/>
+        <p14:creationId xmlns:p14="http://schemas.microsoft.com/office/powerpoint/2010/main" xmlns="" val="3145156136"/>
       </p:ext>
     </p:extLst>
   </p:cSld>
@@ -1369,7 +1536,7 @@
           <a:p>
             <a:r>
               <a:rPr lang="de-CH" dirty="0" smtClean="0"/>
-              <a:t>Kiwi</a:t>
+              <a:t>Nik</a:t>
             </a:r>
             <a:endParaRPr lang="de-CH" dirty="0"/>
           </a:p>
@@ -1392,6 +1559,7 @@
           <a:p>
             <a:fld id="{37E44704-8E6D-4CF2-8CFA-A0F7BC751896}" type="slidenum">
               <a:rPr lang="de-CH" smtClean="0"/>
+              <a:pPr/>
               <a:t>8</a:t>
             </a:fld>
             <a:endParaRPr lang="de-CH"/>
@@ -1401,7 +1569,7 @@
     </p:spTree>
     <p:extLst>
       <p:ext uri="{BB962C8B-B14F-4D97-AF65-F5344CB8AC3E}">
-        <p14:creationId xmlns:p14="http://schemas.microsoft.com/office/powerpoint/2010/main" val="1238143679"/>
+        <p14:creationId xmlns:p14="http://schemas.microsoft.com/office/powerpoint/2010/main" xmlns="" val="3145156136"/>
       </p:ext>
     </p:extLst>
   </p:cSld>
@@ -1455,29 +1623,10 @@
           <a:bodyPr/>
           <a:lstStyle/>
           <a:p>
-            <a:pPr marL="0" marR="0" indent="0" algn="l" defTabSz="914400" rtl="0" eaLnBrk="1" fontAlgn="auto" latinLnBrk="0" hangingPunct="1">
-              <a:lnSpc>
-                <a:spcPct val="100000"/>
-              </a:lnSpc>
-              <a:spcBef>
-                <a:spcPts val="0"/>
-              </a:spcBef>
-              <a:spcAft>
-                <a:spcPts val="0"/>
-              </a:spcAft>
-              <a:buClrTx/>
-              <a:buSzTx/>
-              <a:buFontTx/>
-              <a:buNone/>
-              <a:tabLst/>
-              <a:defRPr/>
-            </a:pPr>
             <a:r>
               <a:rPr lang="de-CH" dirty="0" smtClean="0"/>
               <a:t>Kiwi</a:t>
             </a:r>
-          </a:p>
-          <a:p>
             <a:endParaRPr lang="de-CH" dirty="0"/>
           </a:p>
         </p:txBody>
@@ -1499,6 +1648,7 @@
           <a:p>
             <a:fld id="{37E44704-8E6D-4CF2-8CFA-A0F7BC751896}" type="slidenum">
               <a:rPr lang="de-CH" smtClean="0"/>
+              <a:pPr/>
               <a:t>9</a:t>
             </a:fld>
             <a:endParaRPr lang="de-CH"/>
@@ -1508,7 +1658,7 @@
     </p:spTree>
     <p:extLst>
       <p:ext uri="{BB962C8B-B14F-4D97-AF65-F5344CB8AC3E}">
-        <p14:creationId xmlns:p14="http://schemas.microsoft.com/office/powerpoint/2010/main" val="2867575750"/>
+        <p14:creationId xmlns:p14="http://schemas.microsoft.com/office/powerpoint/2010/main" xmlns="" val="1238143679"/>
       </p:ext>
     </p:extLst>
   </p:cSld>
@@ -1581,55 +1731,8 @@
             </a:pPr>
             <a:r>
               <a:rPr lang="de-CH" dirty="0" smtClean="0"/>
-              <a:t>Frontend:</a:t>
-            </a:r>
-            <a:r>
-              <a:rPr lang="de-CH" baseline="0" dirty="0" smtClean="0"/>
-              <a:t> </a:t>
-            </a:r>
-            <a:r>
-              <a:rPr lang="de-CH" dirty="0" err="1" smtClean="0"/>
-              <a:t>Dani</a:t>
-            </a:r>
-            <a:r>
-              <a:rPr lang="de-CH" dirty="0" smtClean="0"/>
-              <a:t> / Kiwi</a:t>
-            </a:r>
-          </a:p>
-          <a:p>
-            <a:pPr marL="0" marR="0" indent="0" algn="l" defTabSz="914400" rtl="0" eaLnBrk="1" fontAlgn="auto" latinLnBrk="0" hangingPunct="1">
-              <a:lnSpc>
-                <a:spcPct val="100000"/>
-              </a:lnSpc>
-              <a:spcBef>
-                <a:spcPts val="0"/>
-              </a:spcBef>
-              <a:spcAft>
-                <a:spcPts val="0"/>
-              </a:spcAft>
-              <a:buClrTx/>
-              <a:buSzTx/>
-              <a:buFontTx/>
-              <a:buNone/>
-              <a:tabLst/>
-              <a:defRPr/>
-            </a:pPr>
-            <a:r>
-              <a:rPr lang="de-CH" dirty="0" err="1" smtClean="0"/>
-              <a:t>Testing</a:t>
-            </a:r>
-            <a:r>
-              <a:rPr lang="de-CH" smtClean="0"/>
-              <a:t>:</a:t>
-            </a:r>
-            <a:r>
-              <a:rPr lang="de-CH" baseline="0" smtClean="0"/>
-              <a:t> Nik</a:t>
-            </a:r>
-            <a:endParaRPr lang="de-CH" dirty="0" smtClean="0"/>
-          </a:p>
-          <a:p>
-            <a:endParaRPr lang="de-CH" dirty="0" smtClean="0"/>
+              <a:t>Kiwi</a:t>
+            </a:r>
           </a:p>
           <a:p>
             <a:endParaRPr lang="de-CH" dirty="0"/>
@@ -1653,6 +1756,7 @@
           <a:p>
             <a:fld id="{37E44704-8E6D-4CF2-8CFA-A0F7BC751896}" type="slidenum">
               <a:rPr lang="de-CH" smtClean="0"/>
+              <a:pPr/>
               <a:t>10</a:t>
             </a:fld>
             <a:endParaRPr lang="de-CH"/>
@@ -1662,7 +1766,7 @@
     </p:spTree>
     <p:extLst>
       <p:ext uri="{BB962C8B-B14F-4D97-AF65-F5344CB8AC3E}">
-        <p14:creationId xmlns:p14="http://schemas.microsoft.com/office/powerpoint/2010/main" val="4166537278"/>
+        <p14:creationId xmlns:p14="http://schemas.microsoft.com/office/powerpoint/2010/main" xmlns="" val="2867575750"/>
       </p:ext>
     </p:extLst>
   </p:cSld>
@@ -1874,7 +1978,7 @@
           <a:blip r:embed="rId2">
             <a:extLst>
               <a:ext uri="{28A0092B-C50C-407E-A947-70E740481C1C}">
-                <a14:useLocalDpi xmlns:a14="http://schemas.microsoft.com/office/drawing/2010/main" val="0"/>
+                <a14:useLocalDpi xmlns:a14="http://schemas.microsoft.com/office/drawing/2010/main" xmlns="" val="0"/>
               </a:ext>
             </a:extLst>
           </a:blip>
@@ -1897,14 +2001,14 @@
           </a:ln>
           <a:extLst>
             <a:ext uri="{909E8E84-426E-40dd-AFC4-6F175D3DCCD1}">
-              <a14:hiddenFill xmlns:a14="http://schemas.microsoft.com/office/drawing/2010/main" xmlns="">
+              <a14:hiddenFill xmlns="" xmlns:a14="http://schemas.microsoft.com/office/drawing/2010/main">
                 <a:solidFill>
                   <a:srgbClr val="FFFFFF"/>
                 </a:solidFill>
               </a14:hiddenFill>
             </a:ext>
             <a:ext uri="{91240B29-F687-4f45-9708-019B960494DF}">
-              <a14:hiddenLine xmlns:a14="http://schemas.microsoft.com/office/drawing/2010/main" xmlns="" w="9525">
+              <a14:hiddenLine xmlns="" xmlns:a14="http://schemas.microsoft.com/office/drawing/2010/main" w="9525">
                 <a:solidFill>
                   <a:srgbClr val="000000"/>
                 </a:solidFill>
@@ -2308,7 +2412,7 @@
     </p:spTree>
     <p:extLst>
       <p:ext uri="{BB962C8B-B14F-4D97-AF65-F5344CB8AC3E}">
-        <p14:creationId xmlns:p14="http://schemas.microsoft.com/office/powerpoint/2010/main" val="1910704015"/>
+        <p14:creationId xmlns:p14="http://schemas.microsoft.com/office/powerpoint/2010/main" xmlns="" val="1910704015"/>
       </p:ext>
     </p:extLst>
   </p:cSld>
@@ -3014,7 +3118,8 @@
           <a:p>
             <a:fld id="{F19AE9A8-34D4-4E8C-BE9C-13C550F1BED0}" type="slidenum">
               <a:rPr lang="de-CH" smtClean="0"/>
-              <a:t>‹#›</a:t>
+              <a:pPr/>
+              <a:t>‹Nr.›</a:t>
             </a:fld>
             <a:endParaRPr lang="de-CH" dirty="0"/>
           </a:p>
@@ -3023,7 +3128,7 @@
     </p:spTree>
     <p:extLst>
       <p:ext uri="{BB962C8B-B14F-4D97-AF65-F5344CB8AC3E}">
-        <p14:creationId xmlns:p14="http://schemas.microsoft.com/office/powerpoint/2010/main" val="3458445985"/>
+        <p14:creationId xmlns:p14="http://schemas.microsoft.com/office/powerpoint/2010/main" xmlns="" val="3458445985"/>
       </p:ext>
     </p:extLst>
   </p:cSld>
@@ -3067,7 +3172,8 @@
           <a:p>
             <a:fld id="{F19AE9A8-34D4-4E8C-BE9C-13C550F1BED0}" type="slidenum">
               <a:rPr lang="de-CH" smtClean="0"/>
-              <a:t>‹#›</a:t>
+              <a:pPr/>
+              <a:t>‹Nr.›</a:t>
             </a:fld>
             <a:endParaRPr lang="de-CH" dirty="0"/>
           </a:p>
@@ -3076,7 +3182,7 @@
     </p:spTree>
     <p:extLst>
       <p:ext uri="{BB962C8B-B14F-4D97-AF65-F5344CB8AC3E}">
-        <p14:creationId xmlns:p14="http://schemas.microsoft.com/office/powerpoint/2010/main" val="1513825622"/>
+        <p14:creationId xmlns:p14="http://schemas.microsoft.com/office/powerpoint/2010/main" xmlns="" val="1513825622"/>
       </p:ext>
     </p:extLst>
   </p:cSld>
@@ -3347,7 +3453,7 @@
           <a:blip r:embed="rId2">
             <a:extLst>
               <a:ext uri="{28A0092B-C50C-407E-A947-70E740481C1C}">
-                <a14:useLocalDpi xmlns:a14="http://schemas.microsoft.com/office/drawing/2010/main" val="0"/>
+                <a14:useLocalDpi xmlns:a14="http://schemas.microsoft.com/office/drawing/2010/main" xmlns="" val="0"/>
               </a:ext>
             </a:extLst>
           </a:blip>
@@ -3370,14 +3476,14 @@
           </a:ln>
           <a:extLst>
             <a:ext uri="{909E8E84-426E-40dd-AFC4-6F175D3DCCD1}">
-              <a14:hiddenFill xmlns:a14="http://schemas.microsoft.com/office/drawing/2010/main" xmlns="">
+              <a14:hiddenFill xmlns="" xmlns:a14="http://schemas.microsoft.com/office/drawing/2010/main">
                 <a:solidFill>
                   <a:srgbClr val="FFFFFF"/>
                 </a:solidFill>
               </a14:hiddenFill>
             </a:ext>
             <a:ext uri="{91240B29-F687-4f45-9708-019B960494DF}">
-              <a14:hiddenLine xmlns:a14="http://schemas.microsoft.com/office/drawing/2010/main" xmlns="" w="9525">
+              <a14:hiddenLine xmlns="" xmlns:a14="http://schemas.microsoft.com/office/drawing/2010/main" w="9525">
                 <a:solidFill>
                   <a:srgbClr val="000000"/>
                 </a:solidFill>
@@ -3715,7 +3821,7 @@
     </p:spTree>
     <p:extLst>
       <p:ext uri="{BB962C8B-B14F-4D97-AF65-F5344CB8AC3E}">
-        <p14:creationId xmlns:p14="http://schemas.microsoft.com/office/powerpoint/2010/main" val="1402682125"/>
+        <p14:creationId xmlns:p14="http://schemas.microsoft.com/office/powerpoint/2010/main" xmlns="" val="1402682125"/>
       </p:ext>
     </p:extLst>
   </p:cSld>
@@ -4095,7 +4201,8 @@
           <a:p>
             <a:fld id="{F19AE9A8-34D4-4E8C-BE9C-13C550F1BED0}" type="slidenum">
               <a:rPr lang="de-CH" smtClean="0"/>
-              <a:t>‹#›</a:t>
+              <a:pPr/>
+              <a:t>‹Nr.›</a:t>
             </a:fld>
             <a:endParaRPr lang="de-CH" dirty="0"/>
           </a:p>
@@ -4104,7 +4211,7 @@
     </p:spTree>
     <p:extLst>
       <p:ext uri="{BB962C8B-B14F-4D97-AF65-F5344CB8AC3E}">
-        <p14:creationId xmlns:p14="http://schemas.microsoft.com/office/powerpoint/2010/main" val="2446949701"/>
+        <p14:creationId xmlns:p14="http://schemas.microsoft.com/office/powerpoint/2010/main" xmlns="" val="2446949701"/>
       </p:ext>
     </p:extLst>
   </p:cSld>
@@ -4484,7 +4591,8 @@
           <a:p>
             <a:fld id="{F19AE9A8-34D4-4E8C-BE9C-13C550F1BED0}" type="slidenum">
               <a:rPr lang="de-CH" smtClean="0"/>
-              <a:t>‹#›</a:t>
+              <a:pPr/>
+              <a:t>‹Nr.›</a:t>
             </a:fld>
             <a:endParaRPr lang="de-CH" dirty="0"/>
           </a:p>
@@ -4493,7 +4601,7 @@
     </p:spTree>
     <p:extLst>
       <p:ext uri="{BB962C8B-B14F-4D97-AF65-F5344CB8AC3E}">
-        <p14:creationId xmlns:p14="http://schemas.microsoft.com/office/powerpoint/2010/main" val="1790426494"/>
+        <p14:creationId xmlns:p14="http://schemas.microsoft.com/office/powerpoint/2010/main" xmlns="" val="1790426494"/>
       </p:ext>
     </p:extLst>
   </p:cSld>
@@ -4711,7 +4819,8 @@
           <a:p>
             <a:fld id="{F19AE9A8-34D4-4E8C-BE9C-13C550F1BED0}" type="slidenum">
               <a:rPr lang="de-CH" smtClean="0"/>
-              <a:t>‹#›</a:t>
+              <a:pPr/>
+              <a:t>‹Nr.›</a:t>
             </a:fld>
             <a:endParaRPr lang="de-CH" dirty="0"/>
           </a:p>
@@ -4720,7 +4829,7 @@
     </p:spTree>
     <p:extLst>
       <p:ext uri="{BB962C8B-B14F-4D97-AF65-F5344CB8AC3E}">
-        <p14:creationId xmlns:p14="http://schemas.microsoft.com/office/powerpoint/2010/main" val="3841989189"/>
+        <p14:creationId xmlns:p14="http://schemas.microsoft.com/office/powerpoint/2010/main" xmlns="" val="3841989189"/>
       </p:ext>
     </p:extLst>
   </p:cSld>
@@ -5012,7 +5121,8 @@
           <a:p>
             <a:fld id="{F19AE9A8-34D4-4E8C-BE9C-13C550F1BED0}" type="slidenum">
               <a:rPr lang="de-CH" smtClean="0"/>
-              <a:t>‹#›</a:t>
+              <a:pPr/>
+              <a:t>‹Nr.›</a:t>
             </a:fld>
             <a:endParaRPr lang="de-CH" dirty="0"/>
           </a:p>
@@ -5021,7 +5131,7 @@
     </p:spTree>
     <p:extLst>
       <p:ext uri="{BB962C8B-B14F-4D97-AF65-F5344CB8AC3E}">
-        <p14:creationId xmlns:p14="http://schemas.microsoft.com/office/powerpoint/2010/main" val="1455518026"/>
+        <p14:creationId xmlns:p14="http://schemas.microsoft.com/office/powerpoint/2010/main" xmlns="" val="1455518026"/>
       </p:ext>
     </p:extLst>
   </p:cSld>
@@ -5535,7 +5645,8 @@
           <a:p>
             <a:fld id="{F19AE9A8-34D4-4E8C-BE9C-13C550F1BED0}" type="slidenum">
               <a:rPr lang="de-CH" smtClean="0"/>
-              <a:t>‹#›</a:t>
+              <a:pPr/>
+              <a:t>‹Nr.›</a:t>
             </a:fld>
             <a:endParaRPr lang="de-CH" dirty="0"/>
           </a:p>
@@ -5544,7 +5655,7 @@
     </p:spTree>
     <p:extLst>
       <p:ext uri="{BB962C8B-B14F-4D97-AF65-F5344CB8AC3E}">
-        <p14:creationId xmlns:p14="http://schemas.microsoft.com/office/powerpoint/2010/main" val="1026862296"/>
+        <p14:creationId xmlns:p14="http://schemas.microsoft.com/office/powerpoint/2010/main" xmlns="" val="1026862296"/>
       </p:ext>
     </p:extLst>
   </p:cSld>
@@ -6058,7 +6169,8 @@
           <a:p>
             <a:fld id="{F19AE9A8-34D4-4E8C-BE9C-13C550F1BED0}" type="slidenum">
               <a:rPr lang="de-CH" smtClean="0"/>
-              <a:t>‹#›</a:t>
+              <a:pPr/>
+              <a:t>‹Nr.›</a:t>
             </a:fld>
             <a:endParaRPr lang="de-CH" dirty="0"/>
           </a:p>
@@ -6067,7 +6179,7 @@
     </p:spTree>
     <p:extLst>
       <p:ext uri="{BB962C8B-B14F-4D97-AF65-F5344CB8AC3E}">
-        <p14:creationId xmlns:p14="http://schemas.microsoft.com/office/powerpoint/2010/main" val="3807689984"/>
+        <p14:creationId xmlns:p14="http://schemas.microsoft.com/office/powerpoint/2010/main" xmlns="" val="3807689984"/>
       </p:ext>
     </p:extLst>
   </p:cSld>
@@ -6778,7 +6890,8 @@
           <a:p>
             <a:fld id="{F19AE9A8-34D4-4E8C-BE9C-13C550F1BED0}" type="slidenum">
               <a:rPr lang="de-CH" smtClean="0"/>
-              <a:t>‹#›</a:t>
+              <a:pPr/>
+              <a:t>‹Nr.›</a:t>
             </a:fld>
             <a:endParaRPr lang="de-CH" dirty="0"/>
           </a:p>
@@ -6787,7 +6900,7 @@
     </p:spTree>
     <p:extLst>
       <p:ext uri="{BB962C8B-B14F-4D97-AF65-F5344CB8AC3E}">
-        <p14:creationId xmlns:p14="http://schemas.microsoft.com/office/powerpoint/2010/main" val="225970484"/>
+        <p14:creationId xmlns:p14="http://schemas.microsoft.com/office/powerpoint/2010/main" xmlns="" val="225970484"/>
       </p:ext>
     </p:extLst>
   </p:cSld>
@@ -6844,14 +6957,14 @@
           </a:ln>
           <a:extLst>
             <a:ext uri="{909E8E84-426E-40dd-AFC4-6F175D3DCCD1}">
-              <a14:hiddenFill xmlns:a14="http://schemas.microsoft.com/office/drawing/2010/main" xmlns="">
+              <a14:hiddenFill xmlns="" xmlns:a14="http://schemas.microsoft.com/office/drawing/2010/main">
                 <a:solidFill>
                   <a:srgbClr val="FFFFFF"/>
                 </a:solidFill>
               </a14:hiddenFill>
             </a:ext>
             <a:ext uri="{91240B29-F687-4f45-9708-019B960494DF}">
-              <a14:hiddenLine xmlns:a14="http://schemas.microsoft.com/office/drawing/2010/main" xmlns="" w="9525">
+              <a14:hiddenLine xmlns="" xmlns:a14="http://schemas.microsoft.com/office/drawing/2010/main" w="9525">
                 <a:solidFill>
                   <a:srgbClr val="000000"/>
                 </a:solidFill>
@@ -7164,7 +7277,7 @@
             <a:fld id="{F19AE9A8-34D4-4E8C-BE9C-13C550F1BED0}" type="slidenum">
               <a:rPr lang="de-CH" smtClean="0"/>
               <a:pPr/>
-              <a:t>‹#›</a:t>
+              <a:t>‹Nr.›</a:t>
             </a:fld>
             <a:endParaRPr lang="de-CH" dirty="0"/>
           </a:p>
@@ -7700,7 +7813,7 @@
     </p:spTree>
     <p:extLst>
       <p:ext uri="{BB962C8B-B14F-4D97-AF65-F5344CB8AC3E}">
-        <p14:creationId xmlns:p14="http://schemas.microsoft.com/office/powerpoint/2010/main" val="1801327458"/>
+        <p14:creationId xmlns:p14="http://schemas.microsoft.com/office/powerpoint/2010/main" xmlns="" val="1801327458"/>
       </p:ext>
     </p:extLst>
   </p:cSld>
@@ -7736,7 +7849,7 @@
       </p:grpSpPr>
       <p:sp>
         <p:nvSpPr>
-          <p:cNvPr id="5" name="Titel 4"/>
+          <p:cNvPr id="3" name="Titel 2"/>
           <p:cNvSpPr>
             <a:spLocks noGrp="1"/>
           </p:cNvSpPr>
@@ -7750,49 +7863,57 @@
           <a:lstStyle/>
           <a:p>
             <a:r>
-              <a:rPr lang="de-CH" dirty="0" smtClean="0"/>
-              <a:t>Demo</a:t>
-            </a:r>
-            <a:endParaRPr lang="de-CH" dirty="0"/>
-          </a:p>
-        </p:txBody>
-      </p:sp>
-      <p:sp>
-        <p:nvSpPr>
-          <p:cNvPr id="6" name="Untertitel 5"/>
-          <p:cNvSpPr>
-            <a:spLocks noGrp="1"/>
-          </p:cNvSpPr>
-          <p:nvPr>
-            <p:ph type="subTitle" idx="1"/>
-          </p:nvPr>
-        </p:nvSpPr>
-        <p:spPr/>
-        <p:txBody>
-          <a:bodyPr/>
-          <a:lstStyle/>
-          <a:p>
-            <a:endParaRPr lang="de-CH" dirty="0"/>
-          </a:p>
-        </p:txBody>
-      </p:sp>
+              <a:rPr lang="de-DE" dirty="0" err="1" smtClean="0"/>
+              <a:t>Pie</a:t>
+            </a:r>
+            <a:r>
+              <a:rPr lang="de-DE" dirty="0" smtClean="0"/>
+              <a:t> Chart mit d3</a:t>
+            </a:r>
+            <a:endParaRPr lang="de-DE" dirty="0"/>
+          </a:p>
+        </p:txBody>
+      </p:sp>
+      <p:pic>
+        <p:nvPicPr>
+          <p:cNvPr id="4" name="Bild 3" descr="Bildschirmfoto 2015-09-29 um 10.20.36.png"/>
+          <p:cNvPicPr>
+            <a:picLocks noChangeAspect="1"/>
+          </p:cNvPicPr>
+          <p:nvPr/>
+        </p:nvPicPr>
+        <p:blipFill>
+          <a:blip r:embed="rId3">
+            <a:extLst>
+              <a:ext uri="{28A0092B-C50C-407E-A947-70E740481C1C}">
+                <a14:useLocalDpi xmlns:a14="http://schemas.microsoft.com/office/drawing/2010/main" xmlns="" val="0"/>
+              </a:ext>
+            </a:extLst>
+          </a:blip>
+          <a:stretch>
+            <a:fillRect/>
+          </a:stretch>
+        </p:blipFill>
+        <p:spPr>
+          <a:xfrm>
+            <a:off x="2422489" y="1138257"/>
+            <a:ext cx="3932922" cy="4976162"/>
+          </a:xfrm>
+          <a:prstGeom prst="rect">
+            <a:avLst/>
+          </a:prstGeom>
+        </p:spPr>
+      </p:pic>
     </p:spTree>
     <p:extLst>
       <p:ext uri="{BB962C8B-B14F-4D97-AF65-F5344CB8AC3E}">
-        <p14:creationId xmlns:p14="http://schemas.microsoft.com/office/powerpoint/2010/main" val="3900390806"/>
+        <p14:creationId xmlns:p14="http://schemas.microsoft.com/office/powerpoint/2010/main" xmlns="" val="2866249892"/>
       </p:ext>
     </p:extLst>
   </p:cSld>
   <p:clrMapOvr>
     <a:masterClrMapping/>
   </p:clrMapOvr>
-  <p:timing>
-    <p:tnLst>
-      <p:par>
-        <p:cTn id="1" dur="indefinite" restart="never" nodeType="tmRoot"/>
-      </p:par>
-    </p:tnLst>
-  </p:timing>
 </p:sld>
 </file>
 
@@ -7815,6 +7936,85 @@
       </p:grpSpPr>
       <p:sp>
         <p:nvSpPr>
+          <p:cNvPr id="5" name="Titel 4"/>
+          <p:cNvSpPr>
+            <a:spLocks noGrp="1"/>
+          </p:cNvSpPr>
+          <p:nvPr>
+            <p:ph type="ctrTitle"/>
+          </p:nvPr>
+        </p:nvSpPr>
+        <p:spPr/>
+        <p:txBody>
+          <a:bodyPr/>
+          <a:lstStyle/>
+          <a:p>
+            <a:r>
+              <a:rPr lang="de-CH" dirty="0" smtClean="0"/>
+              <a:t>Demo</a:t>
+            </a:r>
+            <a:endParaRPr lang="de-CH" dirty="0"/>
+          </a:p>
+        </p:txBody>
+      </p:sp>
+      <p:sp>
+        <p:nvSpPr>
+          <p:cNvPr id="6" name="Untertitel 5"/>
+          <p:cNvSpPr>
+            <a:spLocks noGrp="1"/>
+          </p:cNvSpPr>
+          <p:nvPr>
+            <p:ph type="subTitle" idx="1"/>
+          </p:nvPr>
+        </p:nvSpPr>
+        <p:spPr/>
+        <p:txBody>
+          <a:bodyPr/>
+          <a:lstStyle/>
+          <a:p>
+            <a:endParaRPr lang="de-CH" dirty="0"/>
+          </a:p>
+        </p:txBody>
+      </p:sp>
+    </p:spTree>
+    <p:extLst>
+      <p:ext uri="{BB962C8B-B14F-4D97-AF65-F5344CB8AC3E}">
+        <p14:creationId xmlns:p14="http://schemas.microsoft.com/office/powerpoint/2010/main" xmlns="" val="3900390806"/>
+      </p:ext>
+    </p:extLst>
+  </p:cSld>
+  <p:clrMapOvr>
+    <a:masterClrMapping/>
+  </p:clrMapOvr>
+  <p:timing>
+    <p:tnLst>
+      <p:par>
+        <p:cTn id="1" dur="indefinite" restart="never" nodeType="tmRoot"/>
+      </p:par>
+    </p:tnLst>
+  </p:timing>
+</p:sld>
+</file>
+
+<file path=ppt/slides/slide12.xml><?xml version="1.0" encoding="utf-8"?>
+<p:sld xmlns:a="http://schemas.openxmlformats.org/drawingml/2006/main" xmlns:r="http://schemas.openxmlformats.org/officeDocument/2006/relationships" xmlns:p="http://schemas.openxmlformats.org/presentationml/2006/main">
+  <p:cSld>
+    <p:spTree>
+      <p:nvGrpSpPr>
+        <p:cNvPr id="1" name=""/>
+        <p:cNvGrpSpPr/>
+        <p:nvPr/>
+      </p:nvGrpSpPr>
+      <p:grpSpPr>
+        <a:xfrm>
+          <a:off x="0" y="0"/>
+          <a:ext cx="0" cy="0"/>
+          <a:chOff x="0" y="0"/>
+          <a:chExt cx="0" cy="0"/>
+        </a:xfrm>
+      </p:grpSpPr>
+      <p:sp>
+        <p:nvSpPr>
           <p:cNvPr id="3" name="Titel 2"/>
           <p:cNvSpPr>
             <a:spLocks noGrp="1"/>
@@ -7846,7 +8046,7 @@
           <a:blip r:embed="rId3">
             <a:extLst>
               <a:ext uri="{28A0092B-C50C-407E-A947-70E740481C1C}">
-                <a14:useLocalDpi xmlns:a14="http://schemas.microsoft.com/office/drawing/2010/main" val="0"/>
+                <a14:useLocalDpi xmlns:a14="http://schemas.microsoft.com/office/drawing/2010/main" xmlns="" val="0"/>
               </a:ext>
             </a:extLst>
           </a:blip>
@@ -7866,7 +8066,7 @@
           <a:noFill/>
           <a:extLst>
             <a:ext uri="{909E8E84-426E-40dd-AFC4-6F175D3DCCD1}">
-              <a14:hiddenFill xmlns:a14="http://schemas.microsoft.com/office/drawing/2010/main" xmlns="">
+              <a14:hiddenFill xmlns="" xmlns:a14="http://schemas.microsoft.com/office/drawing/2010/main">
                 <a:solidFill>
                   <a:srgbClr val="FFFFFF"/>
                 </a:solidFill>
@@ -7878,7 +8078,7 @@
     </p:spTree>
     <p:extLst>
       <p:ext uri="{BB962C8B-B14F-4D97-AF65-F5344CB8AC3E}">
-        <p14:creationId xmlns:p14="http://schemas.microsoft.com/office/powerpoint/2010/main" val="2672802321"/>
+        <p14:creationId xmlns:p14="http://schemas.microsoft.com/office/powerpoint/2010/main" xmlns="" val="2672802321"/>
       </p:ext>
     </p:extLst>
   </p:cSld>
@@ -8084,7 +8284,7 @@
     </p:spTree>
     <p:extLst>
       <p:ext uri="{BB962C8B-B14F-4D97-AF65-F5344CB8AC3E}">
-        <p14:creationId xmlns:p14="http://schemas.microsoft.com/office/powerpoint/2010/main" val="3741675672"/>
+        <p14:creationId xmlns:p14="http://schemas.microsoft.com/office/powerpoint/2010/main" xmlns="" val="3741675672"/>
       </p:ext>
     </p:extLst>
   </p:cSld>
@@ -8237,7 +8437,7 @@
     </p:spTree>
     <p:extLst>
       <p:ext uri="{BB962C8B-B14F-4D97-AF65-F5344CB8AC3E}">
-        <p14:creationId xmlns:p14="http://schemas.microsoft.com/office/powerpoint/2010/main" val="752249650"/>
+        <p14:creationId xmlns:p14="http://schemas.microsoft.com/office/powerpoint/2010/main" xmlns="" val="752249650"/>
       </p:ext>
     </p:extLst>
   </p:cSld>
@@ -8398,7 +8598,7 @@
           <a:blip r:embed="rId4">
             <a:extLst>
               <a:ext uri="{28A0092B-C50C-407E-A947-70E740481C1C}">
-                <a14:useLocalDpi xmlns:a14="http://schemas.microsoft.com/office/drawing/2010/main" val="0"/>
+                <a14:useLocalDpi xmlns:a14="http://schemas.microsoft.com/office/drawing/2010/main" xmlns="" val="0"/>
               </a:ext>
             </a:extLst>
           </a:blip>
@@ -8418,7 +8618,7 @@
           <a:noFill/>
           <a:extLst>
             <a:ext uri="{909E8E84-426E-40dd-AFC4-6F175D3DCCD1}">
-              <a14:hiddenFill xmlns:a14="http://schemas.microsoft.com/office/drawing/2010/main" xmlns="">
+              <a14:hiddenFill xmlns="" xmlns:a14="http://schemas.microsoft.com/office/drawing/2010/main">
                 <a:solidFill>
                   <a:srgbClr val="FFFFFF"/>
                 </a:solidFill>
@@ -8439,7 +8639,7 @@
           <a:blip r:embed="rId5">
             <a:extLst>
               <a:ext uri="{28A0092B-C50C-407E-A947-70E740481C1C}">
-                <a14:useLocalDpi xmlns:a14="http://schemas.microsoft.com/office/drawing/2010/main" val="0"/>
+                <a14:useLocalDpi xmlns:a14="http://schemas.microsoft.com/office/drawing/2010/main" xmlns="" val="0"/>
               </a:ext>
             </a:extLst>
           </a:blip>
@@ -8459,7 +8659,7 @@
           <a:noFill/>
           <a:extLst>
             <a:ext uri="{909E8E84-426E-40dd-AFC4-6F175D3DCCD1}">
-              <a14:hiddenFill xmlns:a14="http://schemas.microsoft.com/office/drawing/2010/main" xmlns="">
+              <a14:hiddenFill xmlns="" xmlns:a14="http://schemas.microsoft.com/office/drawing/2010/main">
                 <a:solidFill>
                   <a:srgbClr val="FFFFFF"/>
                 </a:solidFill>
@@ -8480,7 +8680,7 @@
           <a:blip r:embed="rId6">
             <a:extLst>
               <a:ext uri="{28A0092B-C50C-407E-A947-70E740481C1C}">
-                <a14:useLocalDpi xmlns:a14="http://schemas.microsoft.com/office/drawing/2010/main" val="0"/>
+                <a14:useLocalDpi xmlns:a14="http://schemas.microsoft.com/office/drawing/2010/main" xmlns="" val="0"/>
               </a:ext>
             </a:extLst>
           </a:blip>
@@ -8500,7 +8700,7 @@
           <a:noFill/>
           <a:extLst>
             <a:ext uri="{909E8E84-426E-40dd-AFC4-6F175D3DCCD1}">
-              <a14:hiddenFill xmlns:a14="http://schemas.microsoft.com/office/drawing/2010/main" xmlns="">
+              <a14:hiddenFill xmlns="" xmlns:a14="http://schemas.microsoft.com/office/drawing/2010/main">
                 <a:solidFill>
                   <a:srgbClr val="FFFFFF"/>
                 </a:solidFill>
@@ -8521,7 +8721,7 @@
           <a:blip r:embed="rId7">
             <a:extLst>
               <a:ext uri="{28A0092B-C50C-407E-A947-70E740481C1C}">
-                <a14:useLocalDpi xmlns:a14="http://schemas.microsoft.com/office/drawing/2010/main" val="0"/>
+                <a14:useLocalDpi xmlns:a14="http://schemas.microsoft.com/office/drawing/2010/main" xmlns="" val="0"/>
               </a:ext>
             </a:extLst>
           </a:blip>
@@ -8541,7 +8741,7 @@
           <a:noFill/>
           <a:extLst>
             <a:ext uri="{909E8E84-426E-40dd-AFC4-6F175D3DCCD1}">
-              <a14:hiddenFill xmlns:a14="http://schemas.microsoft.com/office/drawing/2010/main" xmlns="">
+              <a14:hiddenFill xmlns="" xmlns:a14="http://schemas.microsoft.com/office/drawing/2010/main">
                 <a:solidFill>
                   <a:srgbClr val="FFFFFF"/>
                 </a:solidFill>
@@ -8553,7 +8753,7 @@
     </p:spTree>
     <p:extLst>
       <p:ext uri="{BB962C8B-B14F-4D97-AF65-F5344CB8AC3E}">
-        <p14:creationId xmlns:p14="http://schemas.microsoft.com/office/powerpoint/2010/main" val="216023730"/>
+        <p14:creationId xmlns:p14="http://schemas.microsoft.com/office/powerpoint/2010/main" xmlns="" val="216023730"/>
       </p:ext>
     </p:extLst>
   </p:cSld>
@@ -8721,7 +8921,7 @@
           <a:blip r:embed="rId4">
             <a:extLst>
               <a:ext uri="{28A0092B-C50C-407E-A947-70E740481C1C}">
-                <a14:useLocalDpi xmlns:a14="http://schemas.microsoft.com/office/drawing/2010/main" val="0"/>
+                <a14:useLocalDpi xmlns:a14="http://schemas.microsoft.com/office/drawing/2010/main" xmlns="" val="0"/>
               </a:ext>
             </a:extLst>
           </a:blip>
@@ -8741,7 +8941,7 @@
           <a:noFill/>
           <a:extLst>
             <a:ext uri="{909E8E84-426E-40dd-AFC4-6F175D3DCCD1}">
-              <a14:hiddenFill xmlns:a14="http://schemas.microsoft.com/office/drawing/2010/main" xmlns="">
+              <a14:hiddenFill xmlns="" xmlns:a14="http://schemas.microsoft.com/office/drawing/2010/main">
                 <a:solidFill>
                   <a:srgbClr val="FFFFFF"/>
                 </a:solidFill>
@@ -9016,7 +9216,7 @@
     </p:spTree>
     <p:extLst>
       <p:ext uri="{BB962C8B-B14F-4D97-AF65-F5344CB8AC3E}">
-        <p14:creationId xmlns:p14="http://schemas.microsoft.com/office/powerpoint/2010/main" val="3805313728"/>
+        <p14:creationId xmlns:p14="http://schemas.microsoft.com/office/powerpoint/2010/main" xmlns="" val="3805313728"/>
       </p:ext>
     </p:extLst>
   </p:cSld>
@@ -9027,78 +9227,6 @@
 </file>
 
 <file path=ppt/slides/slide6.xml><?xml version="1.0" encoding="utf-8"?>
-<p:sld xmlns:a="http://schemas.openxmlformats.org/drawingml/2006/main" xmlns:r="http://schemas.openxmlformats.org/officeDocument/2006/relationships" xmlns:p="http://schemas.openxmlformats.org/presentationml/2006/main">
-  <p:cSld>
-    <p:spTree>
-      <p:nvGrpSpPr>
-        <p:cNvPr id="1" name=""/>
-        <p:cNvGrpSpPr/>
-        <p:nvPr/>
-      </p:nvGrpSpPr>
-      <p:grpSpPr>
-        <a:xfrm>
-          <a:off x="0" y="0"/>
-          <a:ext cx="0" cy="0"/>
-          <a:chOff x="0" y="0"/>
-          <a:chExt cx="0" cy="0"/>
-        </a:xfrm>
-      </p:grpSpPr>
-      <p:sp>
-        <p:nvSpPr>
-          <p:cNvPr id="2" name="Content Placeholder 1"/>
-          <p:cNvSpPr>
-            <a:spLocks noGrp="1"/>
-          </p:cNvSpPr>
-          <p:nvPr>
-            <p:ph sz="half" idx="1"/>
-          </p:nvPr>
-        </p:nvSpPr>
-        <p:spPr/>
-        <p:txBody>
-          <a:bodyPr/>
-          <a:lstStyle/>
-          <a:p>
-            <a:endParaRPr lang="de-CH"/>
-          </a:p>
-        </p:txBody>
-      </p:sp>
-      <p:sp>
-        <p:nvSpPr>
-          <p:cNvPr id="3" name="Title 2"/>
-          <p:cNvSpPr>
-            <a:spLocks noGrp="1"/>
-          </p:cNvSpPr>
-          <p:nvPr>
-            <p:ph type="ctrTitle"/>
-          </p:nvPr>
-        </p:nvSpPr>
-        <p:spPr/>
-        <p:txBody>
-          <a:bodyPr/>
-          <a:lstStyle/>
-          <a:p>
-            <a:r>
-              <a:rPr lang="en-US" dirty="0" smtClean="0"/>
-              <a:t>Testing</a:t>
-            </a:r>
-            <a:endParaRPr lang="de-CH" dirty="0"/>
-          </a:p>
-        </p:txBody>
-      </p:sp>
-    </p:spTree>
-    <p:extLst>
-      <p:ext uri="{BB962C8B-B14F-4D97-AF65-F5344CB8AC3E}">
-        <p14:creationId xmlns:p14="http://schemas.microsoft.com/office/powerpoint/2010/main" val="764413094"/>
-      </p:ext>
-    </p:extLst>
-  </p:cSld>
-  <p:clrMapOvr>
-    <a:masterClrMapping/>
-  </p:clrMapOvr>
-</p:sld>
-</file>
-
-<file path=ppt/slides/slide7.xml><?xml version="1.0" encoding="utf-8"?>
 <p:sld xmlns:a="http://schemas.openxmlformats.org/drawingml/2006/main" xmlns:r="http://schemas.openxmlformats.org/officeDocument/2006/relationships" xmlns:p="http://schemas.openxmlformats.org/presentationml/2006/main">
   <p:cSld>
     <p:spTree>
@@ -9178,7 +9306,7 @@
         </p:blipFill>
         <p:spPr>
           <a:xfrm>
-            <a:off x="4825621" y="3618459"/>
+            <a:off x="3474696" y="3821659"/>
             <a:ext cx="2701850" cy="2374673"/>
           </a:xfrm>
           <a:prstGeom prst="rect">
@@ -9202,7 +9330,7 @@
         </p:blipFill>
         <p:spPr>
           <a:xfrm>
-            <a:off x="743548" y="3154078"/>
+            <a:off x="264577" y="2834763"/>
             <a:ext cx="2959100" cy="2743200"/>
           </a:xfrm>
           <a:prstGeom prst="rect">
@@ -9226,7 +9354,7 @@
         </p:blipFill>
         <p:spPr>
           <a:xfrm>
-            <a:off x="4272830" y="1714752"/>
+            <a:off x="4272830" y="1605483"/>
             <a:ext cx="3472185" cy="1548595"/>
           </a:xfrm>
           <a:prstGeom prst="rect">
@@ -9258,10 +9386,276 @@
           </a:prstGeom>
         </p:spPr>
       </p:pic>
+      <p:pic>
+        <p:nvPicPr>
+          <p:cNvPr id="10242" name="Picture 2" descr="http://www.wfuns.com/wp-content/uploads/2015/04/uglifyJS.gif"/>
+          <p:cNvPicPr>
+            <a:picLocks noChangeAspect="1" noChangeArrowheads="1"/>
+          </p:cNvPicPr>
+          <p:nvPr/>
+        </p:nvPicPr>
+        <p:blipFill>
+          <a:blip r:embed="rId8"/>
+          <a:srcRect/>
+          <a:stretch>
+            <a:fillRect/>
+          </a:stretch>
+        </p:blipFill>
+        <p:spPr bwMode="auto">
+          <a:xfrm>
+            <a:off x="6796350" y="5993132"/>
+            <a:ext cx="1771650" cy="685800"/>
+          </a:xfrm>
+          <a:prstGeom prst="rect">
+            <a:avLst/>
+          </a:prstGeom>
+          <a:noFill/>
+        </p:spPr>
+      </p:pic>
+      <p:pic>
+        <p:nvPicPr>
+          <p:cNvPr id="10244" name="Picture 4" descr="http://coreboarder.com/blog/wp-content/uploads/2015/07/protractor-logo.png"/>
+          <p:cNvPicPr>
+            <a:picLocks noChangeAspect="1" noChangeArrowheads="1"/>
+          </p:cNvPicPr>
+          <p:nvPr/>
+        </p:nvPicPr>
+        <p:blipFill>
+          <a:blip r:embed="rId9"/>
+          <a:srcRect/>
+          <a:stretch>
+            <a:fillRect/>
+          </a:stretch>
+        </p:blipFill>
+        <p:spPr bwMode="auto">
+          <a:xfrm>
+            <a:off x="6083826" y="3541606"/>
+            <a:ext cx="2484174" cy="560106"/>
+          </a:xfrm>
+          <a:prstGeom prst="rect">
+            <a:avLst/>
+          </a:prstGeom>
+          <a:noFill/>
+        </p:spPr>
+      </p:pic>
     </p:spTree>
     <p:extLst>
       <p:ext uri="{BB962C8B-B14F-4D97-AF65-F5344CB8AC3E}">
-        <p14:creationId xmlns:p14="http://schemas.microsoft.com/office/powerpoint/2010/main" val="3877729246"/>
+        <p14:creationId xmlns:p14="http://schemas.microsoft.com/office/powerpoint/2010/main" xmlns="" val="3877729246"/>
+      </p:ext>
+    </p:extLst>
+  </p:cSld>
+  <p:clrMapOvr>
+    <a:masterClrMapping/>
+  </p:clrMapOvr>
+</p:sld>
+</file>
+
+<file path=ppt/slides/slide7.xml><?xml version="1.0" encoding="utf-8"?>
+<p:sld xmlns:a="http://schemas.openxmlformats.org/drawingml/2006/main" xmlns:r="http://schemas.openxmlformats.org/officeDocument/2006/relationships" xmlns:p="http://schemas.openxmlformats.org/presentationml/2006/main">
+  <p:cSld>
+    <p:spTree>
+      <p:nvGrpSpPr>
+        <p:cNvPr id="1" name=""/>
+        <p:cNvGrpSpPr/>
+        <p:nvPr/>
+      </p:nvGrpSpPr>
+      <p:grpSpPr>
+        <a:xfrm>
+          <a:off x="0" y="0"/>
+          <a:ext cx="0" cy="0"/>
+          <a:chOff x="0" y="0"/>
+          <a:chExt cx="0" cy="0"/>
+        </a:xfrm>
+      </p:grpSpPr>
+      <p:sp>
+        <p:nvSpPr>
+          <p:cNvPr id="2" name="Content Placeholder 1"/>
+          <p:cNvSpPr>
+            <a:spLocks noGrp="1"/>
+          </p:cNvSpPr>
+          <p:nvPr>
+            <p:ph sz="half" idx="1"/>
+          </p:nvPr>
+        </p:nvSpPr>
+        <p:spPr/>
+        <p:txBody>
+          <a:bodyPr/>
+          <a:lstStyle/>
+          <a:p>
+            <a:r>
+              <a:rPr lang="de-CH" dirty="0" smtClean="0"/>
+              <a:t>Erstellte </a:t>
+            </a:r>
+            <a:r>
+              <a:rPr lang="de-CH" dirty="0" err="1" smtClean="0"/>
+              <a:t>Grunt</a:t>
+            </a:r>
+            <a:r>
+              <a:rPr lang="de-CH" dirty="0" smtClean="0"/>
+              <a:t> Tasks</a:t>
+            </a:r>
+          </a:p>
+          <a:p>
+            <a:endParaRPr lang="de-CH" dirty="0" smtClean="0"/>
+          </a:p>
+          <a:p>
+            <a:pPr lvl="1"/>
+            <a:r>
+              <a:rPr lang="de-CH" dirty="0" err="1" smtClean="0">
+                <a:latin typeface="Times New Roman" pitchFamily="18" charset="0"/>
+                <a:cs typeface="Times New Roman" pitchFamily="18" charset="0"/>
+              </a:rPr>
+              <a:t>ugly</a:t>
+            </a:r>
+            <a:r>
+              <a:rPr lang="de-CH" dirty="0" smtClean="0">
+                <a:latin typeface="Times New Roman" pitchFamily="18" charset="0"/>
+                <a:cs typeface="Times New Roman" pitchFamily="18" charset="0"/>
+              </a:rPr>
+              <a:t>		</a:t>
+            </a:r>
+            <a:r>
+              <a:rPr lang="de-CH" dirty="0" err="1" smtClean="0"/>
+              <a:t>UglifyJS</a:t>
+            </a:r>
+            <a:endParaRPr lang="de-CH" dirty="0" smtClean="0"/>
+          </a:p>
+          <a:p>
+            <a:pPr lvl="1"/>
+            <a:r>
+              <a:rPr lang="de-CH" dirty="0" smtClean="0">
+                <a:latin typeface="Times New Roman" pitchFamily="18" charset="0"/>
+                <a:cs typeface="Times New Roman" pitchFamily="18" charset="0"/>
+              </a:rPr>
+              <a:t>test-e2e	</a:t>
+            </a:r>
+            <a:r>
+              <a:rPr lang="de-CH" dirty="0" err="1" smtClean="0"/>
+              <a:t>Protractor</a:t>
+            </a:r>
+          </a:p>
+          <a:p>
+            <a:pPr lvl="1"/>
+            <a:r>
+              <a:rPr lang="de-CH" dirty="0" err="1" smtClean="0">
+                <a:latin typeface="Times New Roman" pitchFamily="18" charset="0"/>
+                <a:cs typeface="Times New Roman" pitchFamily="18" charset="0"/>
+              </a:rPr>
+              <a:t>t</a:t>
+            </a:r>
+            <a:r>
+              <a:rPr lang="de-CH" dirty="0" err="1" smtClean="0">
+                <a:latin typeface="Times New Roman" pitchFamily="18" charset="0"/>
+                <a:cs typeface="Times New Roman" pitchFamily="18" charset="0"/>
+              </a:rPr>
+              <a:t>est-jsh</a:t>
+            </a:r>
+            <a:r>
+              <a:rPr lang="de-CH" dirty="0" smtClean="0">
+                <a:latin typeface="Times New Roman" pitchFamily="18" charset="0"/>
+                <a:cs typeface="Times New Roman" pitchFamily="18" charset="0"/>
+              </a:rPr>
+              <a:t>	</a:t>
+            </a:r>
+            <a:r>
+              <a:rPr lang="de-CH" dirty="0" err="1" smtClean="0"/>
+              <a:t>JsHint</a:t>
+            </a:r>
+            <a:endParaRPr lang="de-CH" dirty="0" smtClean="0"/>
+          </a:p>
+          <a:p>
+            <a:pPr lvl="1"/>
+            <a:r>
+              <a:rPr lang="de-CH" dirty="0" err="1" smtClean="0">
+                <a:latin typeface="Times New Roman" pitchFamily="18" charset="0"/>
+                <a:cs typeface="Times New Roman" pitchFamily="18" charset="0"/>
+              </a:rPr>
+              <a:t>test-cs</a:t>
+            </a:r>
+            <a:r>
+              <a:rPr lang="de-CH" dirty="0" smtClean="0">
+                <a:latin typeface="Times New Roman" pitchFamily="18" charset="0"/>
+                <a:cs typeface="Times New Roman" pitchFamily="18" charset="0"/>
+              </a:rPr>
+              <a:t>		</a:t>
+            </a:r>
+            <a:r>
+              <a:rPr lang="de-CH" dirty="0" err="1" smtClean="0">
+                <a:cs typeface="Times New Roman" pitchFamily="18" charset="0"/>
+              </a:rPr>
+              <a:t>J</a:t>
+            </a:r>
+            <a:r>
+              <a:rPr lang="de-CH" dirty="0" err="1" smtClean="0"/>
+              <a:t>sCodeStyle</a:t>
+            </a:r>
+            <a:endParaRPr lang="de-CH" dirty="0" smtClean="0"/>
+          </a:p>
+          <a:p>
+            <a:endParaRPr lang="de-CH" dirty="0" smtClean="0"/>
+          </a:p>
+          <a:p>
+            <a:r>
+              <a:rPr lang="de-CH" dirty="0" smtClean="0"/>
+              <a:t>Watch Task führt bei jedem speichern </a:t>
+            </a:r>
+            <a:r>
+              <a:rPr lang="de-CH" dirty="0" err="1" smtClean="0"/>
+              <a:t>test-jsh</a:t>
+            </a:r>
+            <a:r>
+              <a:rPr lang="de-CH" dirty="0" smtClean="0"/>
+              <a:t> und </a:t>
+            </a:r>
+            <a:r>
+              <a:rPr lang="de-CH" dirty="0" err="1" smtClean="0"/>
+              <a:t>test-cs</a:t>
+            </a:r>
+            <a:r>
+              <a:rPr lang="de-CH" dirty="0" smtClean="0"/>
+              <a:t> aus</a:t>
+            </a:r>
+            <a:endParaRPr lang="de-CH" dirty="0" smtClean="0"/>
+          </a:p>
+          <a:p>
+            <a:endParaRPr lang="de-CH" dirty="0" smtClean="0"/>
+          </a:p>
+          <a:p>
+            <a:endParaRPr lang="de-CH" dirty="0" smtClean="0"/>
+          </a:p>
+          <a:p>
+            <a:endParaRPr lang="de-CH" dirty="0"/>
+          </a:p>
+        </p:txBody>
+      </p:sp>
+      <p:sp>
+        <p:nvSpPr>
+          <p:cNvPr id="3" name="Title 2"/>
+          <p:cNvSpPr>
+            <a:spLocks noGrp="1"/>
+          </p:cNvSpPr>
+          <p:nvPr>
+            <p:ph type="ctrTitle"/>
+          </p:nvPr>
+        </p:nvSpPr>
+        <p:spPr/>
+        <p:txBody>
+          <a:bodyPr/>
+          <a:lstStyle/>
+          <a:p>
+            <a:r>
+              <a:rPr lang="en-US" dirty="0" smtClean="0"/>
+              <a:t>Grunt Tasks</a:t>
+            </a:r>
+            <a:endParaRPr lang="de-CH" dirty="0"/>
+          </a:p>
+        </p:txBody>
+      </p:sp>
+    </p:spTree>
+    <p:extLst>
+      <p:ext uri="{BB962C8B-B14F-4D97-AF65-F5344CB8AC3E}">
+        <p14:creationId xmlns:p14="http://schemas.microsoft.com/office/powerpoint/2010/main" xmlns="" val="764413094"/>
       </p:ext>
     </p:extLst>
   </p:cSld>
@@ -9290,12 +9684,12 @@
       </p:grpSpPr>
       <p:sp>
         <p:nvSpPr>
-          <p:cNvPr id="3" name="Title 2"/>
+          <p:cNvPr id="2" name="Content Placeholder 1"/>
           <p:cNvSpPr>
             <a:spLocks noGrp="1"/>
           </p:cNvSpPr>
           <p:nvPr>
-            <p:ph type="ctrTitle"/>
+            <p:ph sz="half" idx="1"/>
           </p:nvPr>
         </p:nvSpPr>
         <p:spPr/>
@@ -9304,289 +9698,159 @@
           <a:lstStyle/>
           <a:p>
             <a:r>
-              <a:rPr lang="en-US" dirty="0" smtClean="0"/>
-              <a:t>Frontend - </a:t>
-            </a:r>
-            <a:r>
-              <a:rPr lang="en-US" dirty="0" err="1" smtClean="0"/>
-              <a:t>Grafik</a:t>
-            </a:r>
+              <a:rPr lang="de-CH" dirty="0" smtClean="0"/>
+              <a:t>Idee: </a:t>
+            </a:r>
+          </a:p>
+          <a:p>
+            <a:pPr lvl="1"/>
+            <a:r>
+              <a:rPr lang="de-CH" dirty="0" smtClean="0"/>
+              <a:t>Mit Karma das </a:t>
+            </a:r>
+            <a:r>
+              <a:rPr lang="de-CH" dirty="0" err="1" smtClean="0"/>
+              <a:t>unit</a:t>
+            </a:r>
+            <a:r>
+              <a:rPr lang="de-CH" dirty="0" smtClean="0"/>
+              <a:t> </a:t>
+            </a:r>
+            <a:r>
+              <a:rPr lang="de-CH" dirty="0" err="1" smtClean="0"/>
+              <a:t>Testing</a:t>
+            </a:r>
+            <a:r>
+              <a:rPr lang="de-CH" dirty="0" smtClean="0"/>
+              <a:t> ausführen</a:t>
+            </a:r>
+          </a:p>
+          <a:p>
+            <a:pPr lvl="1"/>
+            <a:r>
+              <a:rPr lang="de-CH" dirty="0" smtClean="0"/>
+              <a:t>Mit </a:t>
+            </a:r>
+            <a:r>
+              <a:rPr lang="de-CH" dirty="0" err="1" smtClean="0"/>
+              <a:t>Protractor</a:t>
+            </a:r>
+            <a:r>
+              <a:rPr lang="de-CH" dirty="0" smtClean="0"/>
+              <a:t> das End2End </a:t>
+            </a:r>
+            <a:r>
+              <a:rPr lang="de-CH" dirty="0" err="1" smtClean="0"/>
+              <a:t>Testing</a:t>
+            </a:r>
+            <a:r>
+              <a:rPr lang="de-CH" dirty="0" smtClean="0"/>
+              <a:t> ausführen</a:t>
+            </a:r>
+          </a:p>
+          <a:p>
+            <a:pPr lvl="1"/>
+            <a:endParaRPr lang="de-CH" dirty="0" smtClean="0"/>
+          </a:p>
+          <a:p>
+            <a:r>
+              <a:rPr lang="de-CH" dirty="0" smtClean="0"/>
+              <a:t>Umgesetzt:</a:t>
+            </a:r>
+          </a:p>
+          <a:p>
+            <a:pPr lvl="1"/>
+            <a:r>
+              <a:rPr lang="de-CH" dirty="0" smtClean="0"/>
+              <a:t>End2End </a:t>
+            </a:r>
+            <a:r>
+              <a:rPr lang="de-CH" dirty="0" err="1" smtClean="0"/>
+              <a:t>Testing</a:t>
+            </a:r>
+            <a:endParaRPr lang="de-CH" dirty="0" smtClean="0"/>
+          </a:p>
+          <a:p>
+            <a:pPr lvl="1"/>
+            <a:endParaRPr lang="de-CH" dirty="0" smtClean="0"/>
+          </a:p>
+          <a:p>
+            <a:r>
+              <a:rPr lang="de-CH" dirty="0" smtClean="0"/>
+              <a:t>Grund:</a:t>
+            </a:r>
+          </a:p>
+          <a:p>
+            <a:r>
+              <a:rPr lang="de-CH" dirty="0" smtClean="0"/>
+              <a:t>Bei einer kompletten </a:t>
+            </a:r>
+            <a:r>
+              <a:rPr lang="de-CH" dirty="0" err="1" smtClean="0"/>
+              <a:t>stateless</a:t>
+            </a:r>
+            <a:r>
+              <a:rPr lang="de-CH" dirty="0" smtClean="0"/>
+              <a:t>- Anwendung ist es sehr schwierig und aufwendig Tests zu schreiben, da die Rest- </a:t>
+            </a:r>
+            <a:r>
+              <a:rPr lang="de-CH" dirty="0" err="1" smtClean="0"/>
+              <a:t>Calls</a:t>
+            </a:r>
+            <a:r>
+              <a:rPr lang="de-CH" dirty="0" smtClean="0"/>
+              <a:t> mit Karma </a:t>
+            </a:r>
+            <a:r>
+              <a:rPr lang="de-CH" dirty="0" err="1" smtClean="0"/>
+              <a:t>gemockt</a:t>
+            </a:r>
+            <a:r>
+              <a:rPr lang="de-CH" dirty="0" smtClean="0"/>
+              <a:t> werden müssen.</a:t>
+            </a:r>
+          </a:p>
+          <a:p>
+            <a:endParaRPr lang="de-CH" dirty="0" smtClean="0"/>
+          </a:p>
+          <a:p>
+            <a:endParaRPr lang="de-CH" dirty="0" smtClean="0"/>
+          </a:p>
+          <a:p>
+            <a:endParaRPr lang="de-CH" dirty="0" smtClean="0"/>
+          </a:p>
+          <a:p>
             <a:endParaRPr lang="de-CH" dirty="0"/>
           </a:p>
         </p:txBody>
       </p:sp>
-      <p:pic>
-        <p:nvPicPr>
-          <p:cNvPr id="4" name="Bild 3"/>
-          <p:cNvPicPr>
-            <a:picLocks noChangeAspect="1"/>
-          </p:cNvPicPr>
-          <p:nvPr/>
-        </p:nvPicPr>
-        <p:blipFill>
-          <a:blip r:embed="rId3"/>
-          <a:stretch>
-            <a:fillRect/>
-          </a:stretch>
-        </p:blipFill>
-        <p:spPr>
-          <a:xfrm>
-            <a:off x="5630763" y="4208436"/>
-            <a:ext cx="3327375" cy="2047615"/>
-          </a:xfrm>
-          <a:prstGeom prst="rect">
-            <a:avLst/>
-          </a:prstGeom>
-        </p:spPr>
-      </p:pic>
-      <p:sp>
-        <p:nvSpPr>
-          <p:cNvPr id="5" name="Inhaltsplatzhalter 1"/>
+      <p:sp>
+        <p:nvSpPr>
+          <p:cNvPr id="3" name="Title 2"/>
           <p:cNvSpPr>
             <a:spLocks noGrp="1"/>
           </p:cNvSpPr>
           <p:nvPr>
-            <p:ph sz="half" idx="1"/>
-          </p:nvPr>
-        </p:nvSpPr>
-        <p:spPr>
-          <a:xfrm>
-            <a:off x="468000" y="1439999"/>
-            <a:ext cx="8100000" cy="4680000"/>
-          </a:xfrm>
-        </p:spPr>
+            <p:ph type="ctrTitle"/>
+          </p:nvPr>
+        </p:nvSpPr>
+        <p:spPr/>
         <p:txBody>
           <a:bodyPr/>
           <a:lstStyle/>
           <a:p>
-            <a:pPr>
-              <a:buFont typeface="Wingdings" panose="05000000000000000000" pitchFamily="2" charset="2"/>
-              <a:buChar char="Ø"/>
-            </a:pPr>
             <a:r>
               <a:rPr lang="en-US" dirty="0" smtClean="0"/>
-              <a:t>JavaScript Library um </a:t>
-            </a:r>
-            <a:r>
-              <a:rPr lang="en-US" dirty="0" err="1" smtClean="0"/>
-              <a:t>Dokumente</a:t>
-            </a:r>
-            <a:r>
-              <a:rPr lang="en-US" dirty="0" smtClean="0"/>
-              <a:t> </a:t>
-            </a:r>
-            <a:r>
-              <a:rPr lang="en-US" dirty="0" err="1" smtClean="0"/>
-              <a:t>basierend</a:t>
-            </a:r>
-            <a:r>
-              <a:rPr lang="en-US" dirty="0" smtClean="0"/>
-              <a:t> auf </a:t>
-            </a:r>
-            <a:r>
-              <a:rPr lang="en-US" dirty="0" err="1" smtClean="0"/>
-              <a:t>Daten</a:t>
-            </a:r>
-            <a:r>
-              <a:rPr lang="en-US" dirty="0" smtClean="0"/>
-              <a:t> </a:t>
-            </a:r>
-            <a:r>
-              <a:rPr lang="en-US" dirty="0" err="1" smtClean="0"/>
-              <a:t>zu</a:t>
-            </a:r>
-            <a:r>
-              <a:rPr lang="en-US" dirty="0" smtClean="0"/>
-              <a:t> </a:t>
-            </a:r>
-            <a:r>
-              <a:rPr lang="en-US" dirty="0" err="1" smtClean="0"/>
-              <a:t>manipulieren</a:t>
-            </a:r>
-            <a:endParaRPr lang="en-US" dirty="0" smtClean="0"/>
-          </a:p>
-          <a:p>
-            <a:pPr>
-              <a:buFont typeface="Wingdings" panose="05000000000000000000" pitchFamily="2" charset="2"/>
-              <a:buChar char="Ø"/>
-            </a:pPr>
-            <a:r>
-              <a:rPr lang="en-US" dirty="0" smtClean="0"/>
-              <a:t>Von Mike </a:t>
-            </a:r>
-            <a:r>
-              <a:rPr lang="en-US" dirty="0" err="1" smtClean="0"/>
-              <a:t>Bostock</a:t>
-            </a:r>
-            <a:r>
-              <a:rPr lang="en-US" dirty="0" smtClean="0"/>
-              <a:t> </a:t>
-            </a:r>
-            <a:r>
-              <a:rPr lang="en-US" dirty="0" err="1" smtClean="0"/>
-              <a:t>erstellt</a:t>
-            </a:r>
-            <a:r>
-              <a:rPr lang="en-US" smtClean="0"/>
-              <a:t>.</a:t>
-            </a:r>
-            <a:endParaRPr lang="en-US" dirty="0" smtClean="0"/>
-          </a:p>
-          <a:p>
-            <a:pPr>
-              <a:buFont typeface="Wingdings" panose="05000000000000000000" pitchFamily="2" charset="2"/>
-              <a:buChar char="Ø"/>
-            </a:pPr>
-            <a:endParaRPr lang="en-US" dirty="0" smtClean="0"/>
-          </a:p>
-          <a:p>
-            <a:pPr>
-              <a:buFont typeface="Wingdings" panose="05000000000000000000" pitchFamily="2" charset="2"/>
-              <a:buChar char="Ø"/>
-            </a:pPr>
-            <a:r>
-              <a:rPr lang="en-US" dirty="0" err="1" smtClean="0"/>
-              <a:t>Warum</a:t>
-            </a:r>
-            <a:r>
-              <a:rPr lang="en-US" dirty="0" smtClean="0"/>
-              <a:t> d3?</a:t>
-            </a:r>
-          </a:p>
-          <a:p>
-            <a:pPr lvl="1">
-              <a:buFont typeface="Wingdings" panose="05000000000000000000" pitchFamily="2" charset="2"/>
-              <a:buChar char="Ø"/>
-            </a:pPr>
-            <a:r>
-              <a:rPr lang="en-US" dirty="0" err="1" smtClean="0"/>
-              <a:t>Flexibel</a:t>
-            </a:r>
-            <a:endParaRPr lang="en-US" dirty="0" smtClean="0"/>
-          </a:p>
-          <a:p>
-            <a:pPr lvl="1">
-              <a:buFont typeface="Wingdings" panose="05000000000000000000" pitchFamily="2" charset="2"/>
-              <a:buChar char="Ø"/>
-            </a:pPr>
-            <a:r>
-              <a:rPr lang="en-US" dirty="0" err="1" smtClean="0"/>
-              <a:t>Grafik</a:t>
-            </a:r>
-            <a:r>
-              <a:rPr lang="en-US" dirty="0" smtClean="0"/>
-              <a:t> </a:t>
-            </a:r>
-            <a:r>
-              <a:rPr lang="en-US" dirty="0" err="1" smtClean="0"/>
-              <a:t>kann</a:t>
-            </a:r>
-            <a:r>
-              <a:rPr lang="en-US" dirty="0" smtClean="0"/>
-              <a:t> so </a:t>
-            </a:r>
-            <a:r>
-              <a:rPr lang="en-US" dirty="0" err="1" smtClean="0"/>
-              <a:t>aussehen</a:t>
-            </a:r>
-            <a:r>
-              <a:rPr lang="en-US" dirty="0" smtClean="0"/>
-              <a:t> </a:t>
-            </a:r>
-            <a:r>
-              <a:rPr lang="en-US" dirty="0" err="1" smtClean="0"/>
-              <a:t>wie</a:t>
-            </a:r>
-            <a:r>
-              <a:rPr lang="en-US" dirty="0" smtClean="0"/>
-              <a:t> </a:t>
-            </a:r>
-            <a:r>
-              <a:rPr lang="en-US" dirty="0" err="1" smtClean="0"/>
-              <a:t>ich</a:t>
-            </a:r>
-            <a:r>
-              <a:rPr lang="en-US" dirty="0" smtClean="0"/>
-              <a:t> </a:t>
-            </a:r>
-            <a:r>
-              <a:rPr lang="en-US" dirty="0" err="1" smtClean="0"/>
-              <a:t>es</a:t>
-            </a:r>
-            <a:r>
-              <a:rPr lang="en-US" dirty="0" smtClean="0"/>
-              <a:t> </a:t>
-            </a:r>
-            <a:r>
-              <a:rPr lang="en-US" dirty="0" err="1" smtClean="0"/>
-              <a:t>als</a:t>
-            </a:r>
-            <a:r>
-              <a:rPr lang="en-US" dirty="0" smtClean="0"/>
-              <a:t> </a:t>
-            </a:r>
-            <a:r>
-              <a:rPr lang="en-US" dirty="0" err="1" smtClean="0"/>
-              <a:t>Entwickler</a:t>
-            </a:r>
-            <a:r>
-              <a:rPr lang="en-US" dirty="0" smtClean="0"/>
-              <a:t> </a:t>
-            </a:r>
-            <a:r>
-              <a:rPr lang="en-US" dirty="0" err="1" smtClean="0"/>
-              <a:t>möchte</a:t>
-            </a:r>
-            <a:endParaRPr lang="en-US" dirty="0" smtClean="0"/>
-          </a:p>
-          <a:p>
-            <a:pPr lvl="1">
-              <a:buFont typeface="Wingdings" panose="05000000000000000000" pitchFamily="2" charset="2"/>
-              <a:buChar char="Ø"/>
-            </a:pPr>
-            <a:r>
-              <a:rPr lang="en-US" dirty="0" smtClean="0"/>
-              <a:t>In JavaScript </a:t>
-            </a:r>
-            <a:r>
-              <a:rPr lang="en-US" dirty="0" err="1" smtClean="0"/>
-              <a:t>geschrieben</a:t>
-            </a:r>
-            <a:r>
-              <a:rPr lang="en-US" dirty="0" smtClean="0"/>
-              <a:t> – Functional style</a:t>
-            </a:r>
-          </a:p>
-          <a:p>
-            <a:pPr lvl="1">
-              <a:buFont typeface="Wingdings" panose="05000000000000000000" pitchFamily="2" charset="2"/>
-              <a:buChar char="Ø"/>
-            </a:pPr>
-            <a:r>
-              <a:rPr lang="en-US" dirty="0" smtClean="0"/>
-              <a:t>“It is as powerful as you want to make it”</a:t>
-            </a:r>
-          </a:p>
-          <a:p>
-            <a:pPr lvl="1">
-              <a:buFont typeface="Wingdings" panose="05000000000000000000" pitchFamily="2" charset="2"/>
-              <a:buChar char="Ø"/>
-            </a:pPr>
-            <a:endParaRPr lang="en-US" dirty="0"/>
-          </a:p>
-          <a:p>
-            <a:pPr>
-              <a:buFont typeface="Wingdings" panose="05000000000000000000" pitchFamily="2" charset="2"/>
-              <a:buChar char="Ø"/>
-            </a:pPr>
-            <a:endParaRPr lang="en-US" dirty="0" smtClean="0"/>
+              <a:t>Testing</a:t>
+            </a:r>
+            <a:endParaRPr lang="de-CH" dirty="0"/>
           </a:p>
         </p:txBody>
       </p:sp>
     </p:spTree>
     <p:extLst>
       <p:ext uri="{BB962C8B-B14F-4D97-AF65-F5344CB8AC3E}">
-        <p14:creationId xmlns:p14="http://schemas.microsoft.com/office/powerpoint/2010/main" val="1084200031"/>
+        <p14:creationId xmlns:p14="http://schemas.microsoft.com/office/powerpoint/2010/main" xmlns="" val="764413094"/>
       </p:ext>
     </p:extLst>
   </p:cSld>
@@ -9615,7 +9879,7 @@
       </p:grpSpPr>
       <p:sp>
         <p:nvSpPr>
-          <p:cNvPr id="3" name="Titel 2"/>
+          <p:cNvPr id="3" name="Title 2"/>
           <p:cNvSpPr>
             <a:spLocks noGrp="1"/>
           </p:cNvSpPr>
@@ -9629,51 +9893,289 @@
           <a:lstStyle/>
           <a:p>
             <a:r>
-              <a:rPr lang="de-DE" dirty="0" err="1" smtClean="0"/>
-              <a:t>Pie</a:t>
-            </a:r>
-            <a:r>
-              <a:rPr lang="de-DE" dirty="0" smtClean="0"/>
-              <a:t> Chart mit d3</a:t>
-            </a:r>
-            <a:endParaRPr lang="de-DE" dirty="0"/>
+              <a:rPr lang="en-US" dirty="0" smtClean="0"/>
+              <a:t>Frontend - </a:t>
+            </a:r>
+            <a:r>
+              <a:rPr lang="en-US" dirty="0" err="1" smtClean="0"/>
+              <a:t>Grafik</a:t>
+            </a:r>
+            <a:endParaRPr lang="de-CH" dirty="0"/>
           </a:p>
         </p:txBody>
       </p:sp>
       <p:pic>
         <p:nvPicPr>
-          <p:cNvPr id="4" name="Bild 3" descr="Bildschirmfoto 2015-09-29 um 10.20.36.png"/>
+          <p:cNvPr id="4" name="Bild 3"/>
           <p:cNvPicPr>
             <a:picLocks noChangeAspect="1"/>
           </p:cNvPicPr>
           <p:nvPr/>
         </p:nvPicPr>
         <p:blipFill>
-          <a:blip r:embed="rId3">
-            <a:extLst>
-              <a:ext uri="{28A0092B-C50C-407E-A947-70E740481C1C}">
-                <a14:useLocalDpi xmlns:a14="http://schemas.microsoft.com/office/drawing/2010/main" val="0"/>
-              </a:ext>
-            </a:extLst>
-          </a:blip>
+          <a:blip r:embed="rId3"/>
           <a:stretch>
             <a:fillRect/>
           </a:stretch>
         </p:blipFill>
         <p:spPr>
           <a:xfrm>
-            <a:off x="2422489" y="1138257"/>
-            <a:ext cx="3932922" cy="4976162"/>
+            <a:off x="5630763" y="4208436"/>
+            <a:ext cx="3327375" cy="2047615"/>
           </a:xfrm>
           <a:prstGeom prst="rect">
             <a:avLst/>
           </a:prstGeom>
         </p:spPr>
       </p:pic>
+      <p:sp>
+        <p:nvSpPr>
+          <p:cNvPr id="5" name="Inhaltsplatzhalter 1"/>
+          <p:cNvSpPr>
+            <a:spLocks noGrp="1"/>
+          </p:cNvSpPr>
+          <p:nvPr>
+            <p:ph sz="half" idx="1"/>
+          </p:nvPr>
+        </p:nvSpPr>
+        <p:spPr>
+          <a:xfrm>
+            <a:off x="468000" y="1439999"/>
+            <a:ext cx="8100000" cy="4680000"/>
+          </a:xfrm>
+        </p:spPr>
+        <p:txBody>
+          <a:bodyPr/>
+          <a:lstStyle/>
+          <a:p>
+            <a:pPr>
+              <a:buFont typeface="Wingdings" panose="05000000000000000000" pitchFamily="2" charset="2"/>
+              <a:buChar char="Ø"/>
+            </a:pPr>
+            <a:r>
+              <a:rPr lang="en-US" dirty="0" smtClean="0"/>
+              <a:t>JavaScript Library um </a:t>
+            </a:r>
+            <a:r>
+              <a:rPr lang="en-US" dirty="0" err="1" smtClean="0"/>
+              <a:t>Dokumente</a:t>
+            </a:r>
+            <a:r>
+              <a:rPr lang="en-US" dirty="0" smtClean="0"/>
+              <a:t> </a:t>
+            </a:r>
+            <a:r>
+              <a:rPr lang="en-US" dirty="0" err="1" smtClean="0"/>
+              <a:t>basierend</a:t>
+            </a:r>
+            <a:r>
+              <a:rPr lang="en-US" dirty="0" smtClean="0"/>
+              <a:t> auf </a:t>
+            </a:r>
+            <a:r>
+              <a:rPr lang="en-US" dirty="0" err="1" smtClean="0"/>
+              <a:t>Daten</a:t>
+            </a:r>
+            <a:r>
+              <a:rPr lang="en-US" dirty="0" smtClean="0"/>
+              <a:t> </a:t>
+            </a:r>
+            <a:r>
+              <a:rPr lang="en-US" dirty="0" err="1" smtClean="0"/>
+              <a:t>zu</a:t>
+            </a:r>
+            <a:r>
+              <a:rPr lang="en-US" dirty="0" smtClean="0"/>
+              <a:t> </a:t>
+            </a:r>
+            <a:r>
+              <a:rPr lang="en-US" dirty="0" err="1" smtClean="0"/>
+              <a:t>manipulieren</a:t>
+            </a:r>
+            <a:endParaRPr lang="en-US" dirty="0" smtClean="0"/>
+          </a:p>
+          <a:p>
+            <a:pPr>
+              <a:buFont typeface="Wingdings" panose="05000000000000000000" pitchFamily="2" charset="2"/>
+              <a:buChar char="Ø"/>
+            </a:pPr>
+            <a:r>
+              <a:rPr lang="en-US" dirty="0" smtClean="0"/>
+              <a:t>Von Mike </a:t>
+            </a:r>
+            <a:r>
+              <a:rPr lang="en-US" dirty="0" err="1" smtClean="0"/>
+              <a:t>Bostock</a:t>
+            </a:r>
+            <a:r>
+              <a:rPr lang="en-US" dirty="0" smtClean="0"/>
+              <a:t> </a:t>
+            </a:r>
+            <a:r>
+              <a:rPr lang="en-US" dirty="0" err="1" smtClean="0"/>
+              <a:t>erstellt</a:t>
+            </a:r>
+            <a:r>
+              <a:rPr lang="en-US" smtClean="0"/>
+              <a:t>.</a:t>
+            </a:r>
+            <a:endParaRPr lang="en-US" dirty="0" smtClean="0"/>
+          </a:p>
+          <a:p>
+            <a:pPr>
+              <a:buFont typeface="Wingdings" panose="05000000000000000000" pitchFamily="2" charset="2"/>
+              <a:buChar char="Ø"/>
+            </a:pPr>
+            <a:endParaRPr lang="en-US" dirty="0" smtClean="0"/>
+          </a:p>
+          <a:p>
+            <a:pPr>
+              <a:buFont typeface="Wingdings" panose="05000000000000000000" pitchFamily="2" charset="2"/>
+              <a:buChar char="Ø"/>
+            </a:pPr>
+            <a:r>
+              <a:rPr lang="en-US" dirty="0" err="1" smtClean="0"/>
+              <a:t>Warum</a:t>
+            </a:r>
+            <a:r>
+              <a:rPr lang="en-US" dirty="0" smtClean="0"/>
+              <a:t> d3?</a:t>
+            </a:r>
+          </a:p>
+          <a:p>
+            <a:pPr lvl="1">
+              <a:buFont typeface="Wingdings" panose="05000000000000000000" pitchFamily="2" charset="2"/>
+              <a:buChar char="Ø"/>
+            </a:pPr>
+            <a:r>
+              <a:rPr lang="en-US" dirty="0" err="1" smtClean="0"/>
+              <a:t>Flexibel</a:t>
+            </a:r>
+            <a:endParaRPr lang="en-US" dirty="0" smtClean="0"/>
+          </a:p>
+          <a:p>
+            <a:pPr lvl="1">
+              <a:buFont typeface="Wingdings" panose="05000000000000000000" pitchFamily="2" charset="2"/>
+              <a:buChar char="Ø"/>
+            </a:pPr>
+            <a:r>
+              <a:rPr lang="en-US" dirty="0" err="1" smtClean="0"/>
+              <a:t>Grafik</a:t>
+            </a:r>
+            <a:r>
+              <a:rPr lang="en-US" dirty="0" smtClean="0"/>
+              <a:t> </a:t>
+            </a:r>
+            <a:r>
+              <a:rPr lang="en-US" dirty="0" err="1" smtClean="0"/>
+              <a:t>kann</a:t>
+            </a:r>
+            <a:r>
+              <a:rPr lang="en-US" dirty="0" smtClean="0"/>
+              <a:t> so </a:t>
+            </a:r>
+            <a:r>
+              <a:rPr lang="en-US" dirty="0" err="1" smtClean="0"/>
+              <a:t>aussehen</a:t>
+            </a:r>
+            <a:r>
+              <a:rPr lang="en-US" dirty="0" smtClean="0"/>
+              <a:t> </a:t>
+            </a:r>
+            <a:r>
+              <a:rPr lang="en-US" dirty="0" err="1" smtClean="0"/>
+              <a:t>wie</a:t>
+            </a:r>
+            <a:r>
+              <a:rPr lang="en-US" dirty="0" smtClean="0"/>
+              <a:t> </a:t>
+            </a:r>
+            <a:r>
+              <a:rPr lang="en-US" dirty="0" err="1" smtClean="0"/>
+              <a:t>ich</a:t>
+            </a:r>
+            <a:r>
+              <a:rPr lang="en-US" dirty="0" smtClean="0"/>
+              <a:t> </a:t>
+            </a:r>
+            <a:r>
+              <a:rPr lang="en-US" dirty="0" err="1" smtClean="0"/>
+              <a:t>es</a:t>
+            </a:r>
+            <a:r>
+              <a:rPr lang="en-US" dirty="0" smtClean="0"/>
+              <a:t> </a:t>
+            </a:r>
+            <a:r>
+              <a:rPr lang="en-US" dirty="0" err="1" smtClean="0"/>
+              <a:t>als</a:t>
+            </a:r>
+            <a:r>
+              <a:rPr lang="en-US" dirty="0" smtClean="0"/>
+              <a:t> </a:t>
+            </a:r>
+            <a:r>
+              <a:rPr lang="en-US" dirty="0" err="1" smtClean="0"/>
+              <a:t>Entwickler</a:t>
+            </a:r>
+            <a:r>
+              <a:rPr lang="en-US" dirty="0" smtClean="0"/>
+              <a:t> </a:t>
+            </a:r>
+            <a:r>
+              <a:rPr lang="en-US" dirty="0" err="1" smtClean="0"/>
+              <a:t>möchte</a:t>
+            </a:r>
+            <a:endParaRPr lang="en-US" dirty="0" smtClean="0"/>
+          </a:p>
+          <a:p>
+            <a:pPr lvl="1">
+              <a:buFont typeface="Wingdings" panose="05000000000000000000" pitchFamily="2" charset="2"/>
+              <a:buChar char="Ø"/>
+            </a:pPr>
+            <a:r>
+              <a:rPr lang="en-US" dirty="0" smtClean="0"/>
+              <a:t>In JavaScript </a:t>
+            </a:r>
+            <a:r>
+              <a:rPr lang="en-US" dirty="0" err="1" smtClean="0"/>
+              <a:t>geschrieben</a:t>
+            </a:r>
+            <a:r>
+              <a:rPr lang="en-US" dirty="0" smtClean="0"/>
+              <a:t> – Functional style</a:t>
+            </a:r>
+          </a:p>
+          <a:p>
+            <a:pPr lvl="1">
+              <a:buFont typeface="Wingdings" panose="05000000000000000000" pitchFamily="2" charset="2"/>
+              <a:buChar char="Ø"/>
+            </a:pPr>
+            <a:r>
+              <a:rPr lang="en-US" dirty="0" smtClean="0"/>
+              <a:t>“It is as powerful as you want to make it”</a:t>
+            </a:r>
+          </a:p>
+          <a:p>
+            <a:pPr lvl="1">
+              <a:buFont typeface="Wingdings" panose="05000000000000000000" pitchFamily="2" charset="2"/>
+              <a:buChar char="Ø"/>
+            </a:pPr>
+            <a:endParaRPr lang="en-US" dirty="0"/>
+          </a:p>
+          <a:p>
+            <a:pPr>
+              <a:buFont typeface="Wingdings" panose="05000000000000000000" pitchFamily="2" charset="2"/>
+              <a:buChar char="Ø"/>
+            </a:pPr>
+            <a:endParaRPr lang="en-US" dirty="0" smtClean="0"/>
+          </a:p>
+        </p:txBody>
+      </p:sp>
     </p:spTree>
     <p:extLst>
       <p:ext uri="{BB962C8B-B14F-4D97-AF65-F5344CB8AC3E}">
-        <p14:creationId xmlns:p14="http://schemas.microsoft.com/office/powerpoint/2010/main" val="2866249892"/>
+        <p14:creationId xmlns:p14="http://schemas.microsoft.com/office/powerpoint/2010/main" xmlns="" val="1084200031"/>
       </p:ext>
     </p:extLst>
   </p:cSld>
@@ -10514,9 +11016,12 @@
 </file>
 
 <file path=customXml/item1.xml><?xml version="1.0" encoding="utf-8"?>
-<p:properties xmlns:p="http://schemas.microsoft.com/office/2006/metadata/properties" xmlns:xsi="http://www.w3.org/2001/XMLSchema-instance" xmlns:pc="http://schemas.microsoft.com/office/infopath/2007/PartnerControls">
-  <documentManagement/>
-</p:properties>
+<?mso-contentType ?>
+<FormTemplates xmlns="http://schemas.microsoft.com/sharepoint/v3/contenttype/forms">
+  <Display>DocumentLibraryForm</Display>
+  <Edit>DocumentLibraryForm</Edit>
+  <New>DocumentLibraryForm</New>
+</FormTemplates>
 </file>
 
 <file path=customXml/item2.xml><?xml version="1.0" encoding="utf-8"?>
@@ -10569,25 +11074,15 @@
 </file>
 
 <file path=customXml/item3.xml><?xml version="1.0" encoding="utf-8"?>
-<?mso-contentType ?>
-<FormTemplates xmlns="http://schemas.microsoft.com/sharepoint/v3/contenttype/forms">
-  <Display>DocumentLibraryForm</Display>
-  <Edit>DocumentLibraryForm</Edit>
-  <New>DocumentLibraryForm</New>
-</FormTemplates>
+<p:properties xmlns:p="http://schemas.microsoft.com/office/2006/metadata/properties" xmlns:xsi="http://www.w3.org/2001/XMLSchema-instance" xmlns:pc="http://schemas.microsoft.com/office/infopath/2007/PartnerControls">
+  <documentManagement/>
+</p:properties>
 </file>
 
 <file path=customXml/itemProps1.xml><?xml version="1.0" encoding="utf-8"?>
-<ds:datastoreItem xmlns:ds="http://schemas.openxmlformats.org/officeDocument/2006/customXml" ds:itemID="{96591048-6F15-48C6-9650-9BFF3E56974F}">
+<ds:datastoreItem xmlns:ds="http://schemas.openxmlformats.org/officeDocument/2006/customXml" ds:itemID="{CCF5E5E7-7F77-47A8-99A9-B4D5839292F3}">
   <ds:schemaRefs>
-    <ds:schemaRef ds:uri="http://purl.org/dc/terms/"/>
-    <ds:schemaRef ds:uri="http://schemas.openxmlformats.org/package/2006/metadata/core-properties"/>
-    <ds:schemaRef ds:uri="http://schemas.microsoft.com/office/2006/documentManagement/types"/>
-    <ds:schemaRef ds:uri="http://purl.org/dc/elements/1.1/"/>
-    <ds:schemaRef ds:uri="http://schemas.microsoft.com/office/2006/metadata/properties"/>
-    <ds:schemaRef ds:uri="http://www.w3.org/XML/1998/namespace"/>
-    <ds:schemaRef ds:uri="http://purl.org/dc/dcmitype/"/>
-    <ds:schemaRef ds:uri="http://schemas.microsoft.com/office/infopath/2007/PartnerControls"/>
+    <ds:schemaRef ds:uri="http://schemas.microsoft.com/sharepoint/v3/contenttype/forms"/>
   </ds:schemaRefs>
 </ds:datastoreItem>
 </file>
@@ -10608,9 +11103,16 @@
 </file>
 
 <file path=customXml/itemProps3.xml><?xml version="1.0" encoding="utf-8"?>
-<ds:datastoreItem xmlns:ds="http://schemas.openxmlformats.org/officeDocument/2006/customXml" ds:itemID="{CCF5E5E7-7F77-47A8-99A9-B4D5839292F3}">
+<ds:datastoreItem xmlns:ds="http://schemas.openxmlformats.org/officeDocument/2006/customXml" ds:itemID="{96591048-6F15-48C6-9650-9BFF3E56974F}">
   <ds:schemaRefs>
-    <ds:schemaRef ds:uri="http://schemas.microsoft.com/sharepoint/v3/contenttype/forms"/>
+    <ds:schemaRef ds:uri="http://purl.org/dc/terms/"/>
+    <ds:schemaRef ds:uri="http://schemas.openxmlformats.org/package/2006/metadata/core-properties"/>
+    <ds:schemaRef ds:uri="http://schemas.microsoft.com/office/2006/documentManagement/types"/>
+    <ds:schemaRef ds:uri="http://purl.org/dc/elements/1.1/"/>
+    <ds:schemaRef ds:uri="http://schemas.microsoft.com/office/2006/metadata/properties"/>
+    <ds:schemaRef ds:uri="http://www.w3.org/XML/1998/namespace"/>
+    <ds:schemaRef ds:uri="http://purl.org/dc/dcmitype/"/>
+    <ds:schemaRef ds:uri="http://schemas.microsoft.com/office/infopath/2007/PartnerControls"/>
   </ds:schemaRefs>
 </ds:datastoreItem>
 </file>
</xml_diff>